<commit_message>
still working on the data preparation and data understanding sections
</commit_message>
<xml_diff>
--- a/ExampleAssignmentTemplate.pptx
+++ b/ExampleAssignmentTemplate.pptx
@@ -481,7 +481,7 @@
           <a:p>
             <a:fld id="{47641A74-98BD-4B3C-827E-E8E43FD96C93}" type="datetimeFigureOut">
               <a:rPr lang="en-GB" smtClean="0"/>
-              <a:t>09/11/2025</a:t>
+              <a:t>19/11/2025</a:t>
             </a:fld>
             <a:endParaRPr lang="en-GB"/>
           </a:p>
@@ -681,7 +681,7 @@
           <a:p>
             <a:fld id="{47641A74-98BD-4B3C-827E-E8E43FD96C93}" type="datetimeFigureOut">
               <a:rPr lang="en-GB" smtClean="0"/>
-              <a:t>09/11/2025</a:t>
+              <a:t>19/11/2025</a:t>
             </a:fld>
             <a:endParaRPr lang="en-GB"/>
           </a:p>
@@ -891,7 +891,7 @@
           <a:p>
             <a:fld id="{47641A74-98BD-4B3C-827E-E8E43FD96C93}" type="datetimeFigureOut">
               <a:rPr lang="en-GB" smtClean="0"/>
-              <a:t>09/11/2025</a:t>
+              <a:t>19/11/2025</a:t>
             </a:fld>
             <a:endParaRPr lang="en-GB"/>
           </a:p>
@@ -1091,7 +1091,7 @@
           <a:p>
             <a:fld id="{47641A74-98BD-4B3C-827E-E8E43FD96C93}" type="datetimeFigureOut">
               <a:rPr lang="en-GB" smtClean="0"/>
-              <a:t>09/11/2025</a:t>
+              <a:t>19/11/2025</a:t>
             </a:fld>
             <a:endParaRPr lang="en-GB"/>
           </a:p>
@@ -1367,7 +1367,7 @@
           <a:p>
             <a:fld id="{47641A74-98BD-4B3C-827E-E8E43FD96C93}" type="datetimeFigureOut">
               <a:rPr lang="en-GB" smtClean="0"/>
-              <a:t>09/11/2025</a:t>
+              <a:t>19/11/2025</a:t>
             </a:fld>
             <a:endParaRPr lang="en-GB"/>
           </a:p>
@@ -1635,7 +1635,7 @@
           <a:p>
             <a:fld id="{47641A74-98BD-4B3C-827E-E8E43FD96C93}" type="datetimeFigureOut">
               <a:rPr lang="en-GB" smtClean="0"/>
-              <a:t>09/11/2025</a:t>
+              <a:t>19/11/2025</a:t>
             </a:fld>
             <a:endParaRPr lang="en-GB"/>
           </a:p>
@@ -2050,7 +2050,7 @@
           <a:p>
             <a:fld id="{47641A74-98BD-4B3C-827E-E8E43FD96C93}" type="datetimeFigureOut">
               <a:rPr lang="en-GB" smtClean="0"/>
-              <a:t>09/11/2025</a:t>
+              <a:t>19/11/2025</a:t>
             </a:fld>
             <a:endParaRPr lang="en-GB"/>
           </a:p>
@@ -2192,7 +2192,7 @@
           <a:p>
             <a:fld id="{47641A74-98BD-4B3C-827E-E8E43FD96C93}" type="datetimeFigureOut">
               <a:rPr lang="en-GB" smtClean="0"/>
-              <a:t>09/11/2025</a:t>
+              <a:t>19/11/2025</a:t>
             </a:fld>
             <a:endParaRPr lang="en-GB"/>
           </a:p>
@@ -2305,7 +2305,7 @@
           <a:p>
             <a:fld id="{47641A74-98BD-4B3C-827E-E8E43FD96C93}" type="datetimeFigureOut">
               <a:rPr lang="en-GB" smtClean="0"/>
-              <a:t>09/11/2025</a:t>
+              <a:t>19/11/2025</a:t>
             </a:fld>
             <a:endParaRPr lang="en-GB"/>
           </a:p>
@@ -2618,7 +2618,7 @@
           <a:p>
             <a:fld id="{47641A74-98BD-4B3C-827E-E8E43FD96C93}" type="datetimeFigureOut">
               <a:rPr lang="en-GB" smtClean="0"/>
-              <a:t>09/11/2025</a:t>
+              <a:t>19/11/2025</a:t>
             </a:fld>
             <a:endParaRPr lang="en-GB"/>
           </a:p>
@@ -2907,7 +2907,7 @@
           <a:p>
             <a:fld id="{47641A74-98BD-4B3C-827E-E8E43FD96C93}" type="datetimeFigureOut">
               <a:rPr lang="en-GB" smtClean="0"/>
-              <a:t>09/11/2025</a:t>
+              <a:t>19/11/2025</a:t>
             </a:fld>
             <a:endParaRPr lang="en-GB"/>
           </a:p>
@@ -3150,7 +3150,7 @@
           <a:p>
             <a:fld id="{47641A74-98BD-4B3C-827E-E8E43FD96C93}" type="datetimeFigureOut">
               <a:rPr lang="en-GB" smtClean="0"/>
-              <a:t>09/11/2025</a:t>
+              <a:t>19/11/2025</a:t>
             </a:fld>
             <a:endParaRPr lang="en-GB"/>
           </a:p>
@@ -3582,7 +3582,7 @@
           <p:nvPr>
             <p:extLst>
               <p:ext uri="{D42A27DB-BD31-4B8C-83A1-F6EECF244321}">
-                <p14:modId xmlns:p14="http://schemas.microsoft.com/office/powerpoint/2010/main" val="2693230681"/>
+                <p14:modId xmlns:p14="http://schemas.microsoft.com/office/powerpoint/2010/main" val="4100831764"/>
               </p:ext>
             </p:extLst>
           </p:nvPr>
@@ -5105,13 +5105,9 @@
           <a:p>
             <a:r>
               <a:rPr lang="en-GB" sz="2800" dirty="0"/>
-              <a:t>CSCU9M5 Assignment 1. Student Number </a:t>
-            </a:r>
-            <a:r>
-              <a:rPr lang="en-GB" sz="2800" dirty="0" err="1"/>
-              <a:t>xxxxxx</a:t>
-            </a:r>
-            <a:endParaRPr lang="en-GB" sz="2800" dirty="0" err="1">
+              <a:t>CSCU9M5 Assignment 1. Student Number 3344671</a:t>
+            </a:r>
+            <a:endParaRPr lang="en-GB" sz="2800" dirty="0">
               <a:ea typeface="Calibri" panose="020F0502020204030204"/>
               <a:cs typeface="Calibri" panose="020F0502020204030204"/>
             </a:endParaRPr>
@@ -8259,12 +8255,9 @@
 </file>
 
 <file path=customXml/item1.xml><?xml version="1.0" encoding="utf-8"?>
-<?mso-contentType ?>
-<FormTemplates xmlns="http://schemas.microsoft.com/sharepoint/v3/contenttype/forms">
-  <Display>DocumentLibraryForm</Display>
-  <Edit>DocumentLibraryForm</Edit>
-  <New>DocumentLibraryForm</New>
-</FormTemplates>
+<p:properties xmlns:p="http://schemas.microsoft.com/office/2006/metadata/properties" xmlns:xsi="http://www.w3.org/2001/XMLSchema-instance" xmlns:pc="http://schemas.microsoft.com/office/infopath/2007/PartnerControls">
+  <documentManagement/>
+</p:properties>
 </file>
 
 <file path=customXml/item2.xml><?xml version="1.0" encoding="utf-8"?>
@@ -8412,15 +8405,19 @@
 </file>
 
 <file path=customXml/item3.xml><?xml version="1.0" encoding="utf-8"?>
-<p:properties xmlns:p="http://schemas.microsoft.com/office/2006/metadata/properties" xmlns:xsi="http://www.w3.org/2001/XMLSchema-instance" xmlns:pc="http://schemas.microsoft.com/office/infopath/2007/PartnerControls">
-  <documentManagement/>
-</p:properties>
+<?mso-contentType ?>
+<FormTemplates xmlns="http://schemas.microsoft.com/sharepoint/v3/contenttype/forms">
+  <Display>DocumentLibraryForm</Display>
+  <Edit>DocumentLibraryForm</Edit>
+  <New>DocumentLibraryForm</New>
+</FormTemplates>
 </file>
 
 <file path=customXml/itemProps1.xml><?xml version="1.0" encoding="utf-8"?>
-<ds:datastoreItem xmlns:ds="http://schemas.openxmlformats.org/officeDocument/2006/customXml" ds:itemID="{B778572B-7D4E-4A33-82E0-6D91E9A8F67C}">
+<ds:datastoreItem xmlns:ds="http://schemas.openxmlformats.org/officeDocument/2006/customXml" ds:itemID="{2149E239-D122-40A9-AB11-D677033190C0}">
   <ds:schemaRefs>
-    <ds:schemaRef ds:uri="http://schemas.microsoft.com/sharepoint/v3/contenttype/forms"/>
+    <ds:schemaRef ds:uri="http://schemas.microsoft.com/office/2006/metadata/properties"/>
+    <ds:schemaRef ds:uri="http://schemas.microsoft.com/office/infopath/2007/PartnerControls"/>
   </ds:schemaRefs>
 </ds:datastoreItem>
 </file>
@@ -8444,10 +8441,9 @@
 </file>
 
 <file path=customXml/itemProps3.xml><?xml version="1.0" encoding="utf-8"?>
-<ds:datastoreItem xmlns:ds="http://schemas.openxmlformats.org/officeDocument/2006/customXml" ds:itemID="{2149E239-D122-40A9-AB11-D677033190C0}">
+<ds:datastoreItem xmlns:ds="http://schemas.openxmlformats.org/officeDocument/2006/customXml" ds:itemID="{B778572B-7D4E-4A33-82E0-6D91E9A8F67C}">
   <ds:schemaRefs>
-    <ds:schemaRef ds:uri="http://schemas.microsoft.com/office/2006/metadata/properties"/>
-    <ds:schemaRef ds:uri="http://schemas.microsoft.com/office/infopath/2007/PartnerControls"/>
+    <ds:schemaRef ds:uri="http://schemas.microsoft.com/sharepoint/v3/contenttype/forms"/>
   </ds:schemaRefs>
 </ds:datastoreItem>
 </file>

</xml_diff>

<commit_message>
completed task 5,6, and 7
</commit_message>
<xml_diff>
--- a/ExampleAssignmentTemplate.pptx
+++ b/ExampleAssignmentTemplate.pptx
@@ -6,7 +6,6 @@
   </p:sldMasterIdLst>
   <p:sldIdLst>
     <p:sldId id="256" r:id="rId5"/>
-    <p:sldId id="257" r:id="rId6"/>
   </p:sldIdLst>
   <p:sldSz cx="9601200" cy="12801600" type="A3"/>
   <p:notesSz cx="6858000" cy="9144000"/>
@@ -262,7 +261,7 @@
           <a:p>
             <a:fld id="{47641A74-98BD-4B3C-827E-E8E43FD96C93}" type="datetimeFigureOut">
               <a:rPr lang="en-GB" smtClean="0"/>
-              <a:t>26/11/2025</a:t>
+              <a:t>27/11/2025</a:t>
             </a:fld>
             <a:endParaRPr lang="en-GB"/>
           </a:p>
@@ -462,7 +461,7 @@
           <a:p>
             <a:fld id="{47641A74-98BD-4B3C-827E-E8E43FD96C93}" type="datetimeFigureOut">
               <a:rPr lang="en-GB" smtClean="0"/>
-              <a:t>26/11/2025</a:t>
+              <a:t>27/11/2025</a:t>
             </a:fld>
             <a:endParaRPr lang="en-GB"/>
           </a:p>
@@ -672,7 +671,7 @@
           <a:p>
             <a:fld id="{47641A74-98BD-4B3C-827E-E8E43FD96C93}" type="datetimeFigureOut">
               <a:rPr lang="en-GB" smtClean="0"/>
-              <a:t>26/11/2025</a:t>
+              <a:t>27/11/2025</a:t>
             </a:fld>
             <a:endParaRPr lang="en-GB"/>
           </a:p>
@@ -872,7 +871,7 @@
           <a:p>
             <a:fld id="{47641A74-98BD-4B3C-827E-E8E43FD96C93}" type="datetimeFigureOut">
               <a:rPr lang="en-GB" smtClean="0"/>
-              <a:t>26/11/2025</a:t>
+              <a:t>27/11/2025</a:t>
             </a:fld>
             <a:endParaRPr lang="en-GB"/>
           </a:p>
@@ -1148,7 +1147,7 @@
           <a:p>
             <a:fld id="{47641A74-98BD-4B3C-827E-E8E43FD96C93}" type="datetimeFigureOut">
               <a:rPr lang="en-GB" smtClean="0"/>
-              <a:t>26/11/2025</a:t>
+              <a:t>27/11/2025</a:t>
             </a:fld>
             <a:endParaRPr lang="en-GB"/>
           </a:p>
@@ -1416,7 +1415,7 @@
           <a:p>
             <a:fld id="{47641A74-98BD-4B3C-827E-E8E43FD96C93}" type="datetimeFigureOut">
               <a:rPr lang="en-GB" smtClean="0"/>
-              <a:t>26/11/2025</a:t>
+              <a:t>27/11/2025</a:t>
             </a:fld>
             <a:endParaRPr lang="en-GB"/>
           </a:p>
@@ -1831,7 +1830,7 @@
           <a:p>
             <a:fld id="{47641A74-98BD-4B3C-827E-E8E43FD96C93}" type="datetimeFigureOut">
               <a:rPr lang="en-GB" smtClean="0"/>
-              <a:t>26/11/2025</a:t>
+              <a:t>27/11/2025</a:t>
             </a:fld>
             <a:endParaRPr lang="en-GB"/>
           </a:p>
@@ -1973,7 +1972,7 @@
           <a:p>
             <a:fld id="{47641A74-98BD-4B3C-827E-E8E43FD96C93}" type="datetimeFigureOut">
               <a:rPr lang="en-GB" smtClean="0"/>
-              <a:t>26/11/2025</a:t>
+              <a:t>27/11/2025</a:t>
             </a:fld>
             <a:endParaRPr lang="en-GB"/>
           </a:p>
@@ -2086,7 +2085,7 @@
           <a:p>
             <a:fld id="{47641A74-98BD-4B3C-827E-E8E43FD96C93}" type="datetimeFigureOut">
               <a:rPr lang="en-GB" smtClean="0"/>
-              <a:t>26/11/2025</a:t>
+              <a:t>27/11/2025</a:t>
             </a:fld>
             <a:endParaRPr lang="en-GB"/>
           </a:p>
@@ -2399,7 +2398,7 @@
           <a:p>
             <a:fld id="{47641A74-98BD-4B3C-827E-E8E43FD96C93}" type="datetimeFigureOut">
               <a:rPr lang="en-GB" smtClean="0"/>
-              <a:t>26/11/2025</a:t>
+              <a:t>27/11/2025</a:t>
             </a:fld>
             <a:endParaRPr lang="en-GB"/>
           </a:p>
@@ -2688,7 +2687,7 @@
           <a:p>
             <a:fld id="{47641A74-98BD-4B3C-827E-E8E43FD96C93}" type="datetimeFigureOut">
               <a:rPr lang="en-GB" smtClean="0"/>
-              <a:t>26/11/2025</a:t>
+              <a:t>27/11/2025</a:t>
             </a:fld>
             <a:endParaRPr lang="en-GB"/>
           </a:p>
@@ -2931,7 +2930,7 @@
           <a:p>
             <a:fld id="{47641A74-98BD-4B3C-827E-E8E43FD96C93}" type="datetimeFigureOut">
               <a:rPr lang="en-GB" smtClean="0"/>
-              <a:t>26/11/2025</a:t>
+              <a:t>27/11/2025</a:t>
             </a:fld>
             <a:endParaRPr lang="en-GB"/>
           </a:p>
@@ -3363,14 +3362,14 @@
           <p:nvPr>
             <p:extLst>
               <p:ext uri="{D42A27DB-BD31-4B8C-83A1-F6EECF244321}">
-                <p14:modId xmlns:p14="http://schemas.microsoft.com/office/powerpoint/2010/main" val="1175326873"/>
+                <p14:modId xmlns:p14="http://schemas.microsoft.com/office/powerpoint/2010/main" val="1483958890"/>
               </p:ext>
             </p:extLst>
           </p:nvPr>
         </p:nvGraphicFramePr>
         <p:xfrm>
           <a:off x="212538" y="640569"/>
-          <a:ext cx="9235515" cy="11873954"/>
+          <a:ext cx="9235515" cy="12141612"/>
         </p:xfrm>
         <a:graphic>
           <a:graphicData uri="http://schemas.openxmlformats.org/drawingml/2006/table">
@@ -3510,15 +3509,7 @@
                       </a:pPr>
                       <a:r>
                         <a:rPr lang="en-GB" sz="1100" dirty="0"/>
-                        <a:t>In the ISI variable histogram showed there is one extreme outlier far outside the normal range. The outlier was trimmed using the select rows widget in Orange. Histograms </a:t>
-                      </a:r>
-                      <a:r>
-                        <a:rPr lang="en-GB" sz="1100"/>
-                        <a:t>below show </a:t>
-                      </a:r>
-                      <a:r>
-                        <a:rPr lang="en-GB" sz="1100" dirty="0"/>
-                        <a:t>the ISI distribution before and after cleaning.</a:t>
+                        <a:t>In the ISI variable histogram showed there is one extreme outlier far outside the normal range. The outlier was trimmed using the select rows widget in Orange. Histograms below show the ISI distribution before and after cleaning.</a:t>
                       </a:r>
                     </a:p>
                     <a:p>
@@ -3653,7 +3644,7 @@
                       </a:pPr>
                       <a:r>
                         <a:rPr lang="en-US" sz="1050" dirty="0"/>
-                        <a:t>A table showing the different models and hyper parameters you trained, </a:t>
+                        <a:t>This table below is showing the different models and hyper parameters that were </a:t>
                       </a:r>
                     </a:p>
                     <a:p>
@@ -3676,7 +3667,7 @@
                       </a:pPr>
                       <a:r>
                         <a:rPr lang="en-US" sz="1050" dirty="0"/>
-                        <a:t>along with the correct metric for each; Add a sentence on how you chose the hyper parameter values. Make sure you name the metric correctly.</a:t>
+                        <a:t>trained, along with the correct metric for each;</a:t>
                       </a:r>
                       <a:endParaRPr lang="en-GB" sz="1050" kern="1200" dirty="0">
                         <a:solidFill>
@@ -3769,6 +3760,46 @@
                         <a:defRPr/>
                       </a:pPr>
                       <a:r>
+                        <a:rPr lang="en-GB" sz="1050" dirty="0">
+                          <a:latin typeface="Times New Roman" panose="02020603050405020304" pitchFamily="18" charset="0"/>
+                          <a:cs typeface="Times New Roman" panose="02020603050405020304" pitchFamily="18" charset="0"/>
+                        </a:rPr>
+                        <a:t>Gradient Boosting achieved the highest validation score for both F1 score and Classification Accuracy although Random Forest performed better with training data it achieved lower validation accuracy, pointing out that Random Forest is overfitting. For this reason, Gradient Boosting was chosen as the final model.  </a:t>
+                      </a:r>
+                      <a:endParaRPr kumimoji="0" lang="en-GB" sz="1050" b="0" i="0" u="none" strike="noStrike" kern="1200" cap="none" spc="0" normalizeH="0" baseline="0" noProof="0" dirty="0">
+                        <a:ln>
+                          <a:noFill/>
+                        </a:ln>
+                        <a:solidFill>
+                          <a:prstClr val="black"/>
+                        </a:solidFill>
+                        <a:effectLst/>
+                        <a:uLnTx/>
+                        <a:uFillTx/>
+                        <a:latin typeface="+mn-lt"/>
+                        <a:ea typeface="+mn-ea"/>
+                        <a:cs typeface="+mn-cs"/>
+                      </a:endParaRPr>
+                    </a:p>
+                    <a:p>
+                      <a:pPr marL="0" marR="0" lvl="0" indent="0" algn="l" defTabSz="1706910" rtl="0" eaLnBrk="1" fontAlgn="auto" latinLnBrk="0" hangingPunct="1">
+                        <a:lnSpc>
+                          <a:spcPct val="100000"/>
+                        </a:lnSpc>
+                        <a:spcBef>
+                          <a:spcPts val="0"/>
+                        </a:spcBef>
+                        <a:spcAft>
+                          <a:spcPts val="0"/>
+                        </a:spcAft>
+                        <a:buClrTx/>
+                        <a:buSzTx/>
+                        <a:buFontTx/>
+                        <a:buNone/>
+                        <a:tabLst/>
+                        <a:defRPr/>
+                      </a:pPr>
+                      <a:r>
                         <a:rPr kumimoji="0" lang="en-GB" sz="1050" b="0" i="0" u="none" strike="noStrike" kern="1200" cap="none" spc="0" normalizeH="0" baseline="0" noProof="0" dirty="0">
                           <a:ln>
                             <a:noFill/>
@@ -3783,7 +3814,7 @@
                           <a:ea typeface="+mn-ea"/>
                           <a:cs typeface="+mn-cs"/>
                         </a:rPr>
-                        <a:t>Say how you chose the final model to test, and how you trained that model.</a:t>
+                        <a:t>Below is the confusion metric of the Gradient Boosting model. </a:t>
                       </a:r>
                     </a:p>
                     <a:p>
@@ -3837,23 +3868,20 @@
                         <a:tabLst/>
                         <a:defRPr/>
                       </a:pPr>
-                      <a:r>
-                        <a:rPr kumimoji="0" lang="en-GB" sz="1050" b="0" i="0" u="none" strike="noStrike" kern="1200" cap="none" spc="0" normalizeH="0" baseline="0" noProof="0" dirty="0">
-                          <a:ln>
-                            <a:noFill/>
-                          </a:ln>
-                          <a:solidFill>
-                            <a:prstClr val="black"/>
-                          </a:solidFill>
-                          <a:effectLst/>
-                          <a:uLnTx/>
-                          <a:uFillTx/>
-                          <a:latin typeface="+mn-lt"/>
-                          <a:ea typeface="+mn-ea"/>
-                          <a:cs typeface="+mn-cs"/>
-                        </a:rPr>
-                        <a:t>Put the confusion matrix here</a:t>
-                      </a:r>
+                      <a:endParaRPr kumimoji="0" lang="en-GB" sz="1050" b="0" i="0" u="none" strike="noStrike" kern="1200" cap="none" spc="0" normalizeH="0" baseline="0" noProof="0" dirty="0">
+                        <a:ln>
+                          <a:noFill/>
+                        </a:ln>
+                        <a:solidFill>
+                          <a:prstClr val="black"/>
+                        </a:solidFill>
+                        <a:effectLst/>
+                        <a:uLnTx/>
+                        <a:uFillTx/>
+                        <a:latin typeface="+mn-lt"/>
+                        <a:ea typeface="+mn-ea"/>
+                        <a:cs typeface="+mn-cs"/>
+                      </a:endParaRPr>
                     </a:p>
                     <a:p>
                       <a:pPr marL="0" marR="0" lvl="0" indent="0" algn="l" defTabSz="1706910" rtl="0" eaLnBrk="1" fontAlgn="auto" latinLnBrk="0" hangingPunct="1">
@@ -3972,40 +4000,7 @@
                         <a:tabLst/>
                         <a:defRPr/>
                       </a:pPr>
-                      <a:endParaRPr kumimoji="0" lang="en-GB" sz="1050" b="0" i="0" u="none" strike="noStrike" kern="1200" cap="none" spc="0" normalizeH="0" baseline="0" noProof="0" dirty="0">
-                        <a:ln>
-                          <a:noFill/>
-                        </a:ln>
-                        <a:solidFill>
-                          <a:prstClr val="black"/>
-                        </a:solidFill>
-                        <a:effectLst/>
-                        <a:uLnTx/>
-                        <a:uFillTx/>
-                        <a:latin typeface="+mn-lt"/>
-                        <a:ea typeface="+mn-ea"/>
-                        <a:cs typeface="+mn-cs"/>
-                      </a:endParaRPr>
-                    </a:p>
-                    <a:p>
-                      <a:pPr marL="0" marR="0" lvl="0" indent="0" algn="l" defTabSz="1706910" rtl="0" eaLnBrk="1" fontAlgn="auto" latinLnBrk="0" hangingPunct="1">
-                        <a:lnSpc>
-                          <a:spcPct val="100000"/>
-                        </a:lnSpc>
-                        <a:spcBef>
-                          <a:spcPts val="0"/>
-                        </a:spcBef>
-                        <a:spcAft>
-                          <a:spcPts val="0"/>
-                        </a:spcAft>
-                        <a:buClrTx/>
-                        <a:buSzTx/>
-                        <a:buFontTx/>
-                        <a:buNone/>
-                        <a:tabLst/>
-                        <a:defRPr/>
-                      </a:pPr>
-                      <a:endParaRPr kumimoji="0" lang="en-GB" sz="1050" b="0" i="0" u="none" strike="noStrike" kern="1200" cap="none" spc="0" normalizeH="0" baseline="0" noProof="0" dirty="0">
+                      <a:endParaRPr kumimoji="0" lang="en-GB" sz="1200" b="0" i="0" u="none" strike="noStrike" kern="1200" cap="none" spc="0" normalizeH="0" baseline="0" noProof="0" dirty="0">
                         <a:ln>
                           <a:noFill/>
                         </a:ln>
@@ -4137,42 +4132,9 @@
                         <a:tabLst/>
                         <a:defRPr/>
                       </a:pPr>
-                      <a:endParaRPr kumimoji="0" lang="en-GB" sz="1200" b="0" i="0" u="none" strike="noStrike" kern="1200" cap="none" spc="0" normalizeH="0" baseline="0" noProof="0" dirty="0">
-                        <a:ln>
-                          <a:noFill/>
-                        </a:ln>
-                        <a:solidFill>
-                          <a:prstClr val="black"/>
-                        </a:solidFill>
-                        <a:effectLst/>
-                        <a:uLnTx/>
-                        <a:uFillTx/>
-                        <a:latin typeface="+mn-lt"/>
-                        <a:ea typeface="+mn-ea"/>
-                        <a:cs typeface="+mn-cs"/>
-                      </a:endParaRPr>
-                    </a:p>
-                    <a:p>
-                      <a:pPr marL="0" marR="0" lvl="0" indent="0" algn="l" defTabSz="1706910" rtl="0" eaLnBrk="1" fontAlgn="auto" latinLnBrk="0" hangingPunct="1">
-                        <a:lnSpc>
-                          <a:spcPct val="100000"/>
-                        </a:lnSpc>
-                        <a:spcBef>
-                          <a:spcPts val="0"/>
-                        </a:spcBef>
-                        <a:spcAft>
-                          <a:spcPts val="0"/>
-                        </a:spcAft>
-                        <a:buClrTx/>
-                        <a:buSzTx/>
-                        <a:buFontTx/>
-                        <a:buNone/>
-                        <a:tabLst/>
-                        <a:defRPr/>
-                      </a:pPr>
                       <a:r>
                         <a:rPr lang="en-GB" sz="1050" dirty="0"/>
-                        <a:t>Explain what the confusion matrix tells us.</a:t>
+                        <a:t>The confusion matrix tells us that we model correctly predicts most cases. We have 29 true negatives and 41 true positives which are correct predictions. We also have 7 errors for this model 2 are false positives and 5 false negatives. This means the model predicts that 5 areas which burned more than 4% did not burn which can be cause a safety risk. However, the model performs well with more correct prediction than incorrect predictions on unseen test data. </a:t>
                       </a:r>
                     </a:p>
                     <a:p>
@@ -4229,22 +4191,10 @@
                       <a:endParaRPr lang="en-GB" sz="1200" dirty="0"/>
                     </a:p>
                     <a:p>
-                      <a:pPr marL="457200" lvl="0" indent="-457200">
-                        <a:buFont typeface="Arial"/>
-                        <a:buChar char="•"/>
-                      </a:pPr>
-                      <a:r>
-                        <a:rPr lang="en-GB" sz="1050" b="0" i="0" u="none" strike="noStrike" noProof="0" dirty="0">
-                          <a:solidFill>
-                            <a:srgbClr val="000000"/>
-                          </a:solidFill>
-                          <a:latin typeface="Calibri"/>
-                        </a:rPr>
-                        <a:t>For example, did you learn anything about specific features that drive the model? Is the model biased towards particular groups in the data? Is the model you've chosen good for helping us to understand why particular predictions are made?</a:t>
-                      </a:r>
-                    </a:p>
-                    <a:p>
-                      <a:endParaRPr lang="en-GB" sz="1200" dirty="0"/>
+                      <a:r>
+                        <a:rPr lang="en-GB" sz="1200" dirty="0"/>
+                        <a:t>I learn that tree-based models like Random Forest , Decision Tree and Gradient Boosting outperformed linear models which shows that relationship between features is nonlinear. With ranking importance of features, it is shown that DC, Month, DMC, Y, and Temp are the five most important features. This means drought conditions, seasonal patterns and location are important indicators of fire. The model seems unbiased between the classes as the confusion matrix showed we had five false negatives and two positive negatives which does not suggest that this model favours one more than the other. </a:t>
+                      </a:r>
                     </a:p>
                     <a:p>
                       <a:endParaRPr lang="en-GB" sz="1200" dirty="0"/>
@@ -4306,7 +4256,7 @@
         </p:nvSpPr>
         <p:spPr>
           <a:xfrm>
-            <a:off x="5086291" y="10476758"/>
+            <a:off x="4939741" y="10673247"/>
             <a:ext cx="3637442" cy="807913"/>
           </a:xfrm>
           <a:prstGeom prst="rect">
@@ -4363,7 +4313,7 @@
           <p:nvPr>
             <p:extLst>
               <p:ext uri="{D42A27DB-BD31-4B8C-83A1-F6EECF244321}">
-                <p14:modId xmlns:p14="http://schemas.microsoft.com/office/powerpoint/2010/main" val="200926046"/>
+                <p14:modId xmlns:p14="http://schemas.microsoft.com/office/powerpoint/2010/main" val="539695108"/>
               </p:ext>
             </p:extLst>
           </p:nvPr>
@@ -4498,29 +4448,6 @@
                     <a:bodyPr/>
                     <a:lstStyle/>
                     <a:p>
-                      <a:r>
-                        <a:rPr lang="en-GB" sz="800" b="0" dirty="0">
-                          <a:latin typeface="Times New Roman" panose="02020603050405020304" pitchFamily="18" charset="0"/>
-                          <a:cs typeface="Times New Roman" panose="02020603050405020304" pitchFamily="18" charset="0"/>
-                        </a:rPr>
-                        <a:t>CA: 0.922, F1: 0.922</a:t>
-                      </a:r>
-                    </a:p>
-                  </a:txBody>
-                  <a:tcPr/>
-                </a:tc>
-                <a:extLst>
-                  <a:ext uri="{0D108BD9-81ED-4DB2-BD59-A6C34878D82A}">
-                    <a16:rowId xmlns:a16="http://schemas.microsoft.com/office/drawing/2014/main" val="391472538"/>
-                  </a:ext>
-                </a:extLst>
-              </a:tr>
-              <a:tr h="444364">
-                <a:tc>
-                  <a:txBody>
-                    <a:bodyPr/>
-                    <a:lstStyle/>
-                    <a:p>
                       <a:pPr marL="0" marR="0" lvl="0" indent="0" algn="l" defTabSz="1706910" rtl="0" eaLnBrk="1" fontAlgn="auto" latinLnBrk="0" hangingPunct="1">
                         <a:lnSpc>
                           <a:spcPct val="100000"/>
@@ -4543,28 +4470,25 @@
                           <a:latin typeface="Times New Roman" panose="02020603050405020304" pitchFamily="18" charset="0"/>
                           <a:cs typeface="Times New Roman" panose="02020603050405020304" pitchFamily="18" charset="0"/>
                         </a:rPr>
-                        <a:t>Gradient Boosting </a:t>
-                      </a:r>
-                    </a:p>
-                  </a:txBody>
-                  <a:tcPr/>
-                </a:tc>
-                <a:tc>
-                  <a:txBody>
-                    <a:bodyPr/>
-                    <a:lstStyle/>
-                    <a:p>
-                      <a:r>
-                        <a:rPr lang="en-GB" sz="800" b="0" dirty="0">
-                          <a:latin typeface="Times New Roman" panose="02020603050405020304" pitchFamily="18" charset="0"/>
-                          <a:cs typeface="Times New Roman" panose="02020603050405020304" pitchFamily="18" charset="0"/>
-                        </a:rPr>
-                        <a:t>150 trees, 0.1 learning rate, depth limit 3, subsampling 1.00, Do not split subsets smaller than 2</a:t>
-                      </a:r>
-                    </a:p>
-                  </a:txBody>
-                  <a:tcPr/>
-                </a:tc>
+                        <a:t>CA: 0.909, F1: 0.909</a:t>
+                      </a:r>
+                    </a:p>
+                    <a:p>
+                      <a:endParaRPr lang="en-GB" sz="800" b="0" dirty="0">
+                        <a:latin typeface="Times New Roman" panose="02020603050405020304" pitchFamily="18" charset="0"/>
+                        <a:cs typeface="Times New Roman" panose="02020603050405020304" pitchFamily="18" charset="0"/>
+                      </a:endParaRPr>
+                    </a:p>
+                  </a:txBody>
+                  <a:tcPr/>
+                </a:tc>
+                <a:extLst>
+                  <a:ext uri="{0D108BD9-81ED-4DB2-BD59-A6C34878D82A}">
+                    <a16:rowId xmlns:a16="http://schemas.microsoft.com/office/drawing/2014/main" val="391472538"/>
+                  </a:ext>
+                </a:extLst>
+              </a:tr>
+              <a:tr h="444364">
                 <a:tc>
                   <a:txBody>
                     <a:bodyPr/>
@@ -4592,14 +4516,40 @@
                           <a:latin typeface="Times New Roman" panose="02020603050405020304" pitchFamily="18" charset="0"/>
                           <a:cs typeface="Times New Roman" panose="02020603050405020304" pitchFamily="18" charset="0"/>
                         </a:rPr>
+                        <a:t>Gradient Boosting </a:t>
+                      </a:r>
+                    </a:p>
+                  </a:txBody>
+                  <a:tcPr/>
+                </a:tc>
+                <a:tc>
+                  <a:txBody>
+                    <a:bodyPr/>
+                    <a:lstStyle/>
+                    <a:p>
+                      <a:r>
+                        <a:rPr lang="en-GB" sz="800" b="0" dirty="0">
+                          <a:latin typeface="Times New Roman" panose="02020603050405020304" pitchFamily="18" charset="0"/>
+                          <a:cs typeface="Times New Roman" panose="02020603050405020304" pitchFamily="18" charset="0"/>
+                        </a:rPr>
+                        <a:t>150 trees, 0.1 learning rate, depth limit 3, subsampling 1.00, Do not split subsets smaller than 2</a:t>
+                      </a:r>
+                    </a:p>
+                  </a:txBody>
+                  <a:tcPr/>
+                </a:tc>
+                <a:tc>
+                  <a:txBody>
+                    <a:bodyPr/>
+                    <a:lstStyle/>
+                    <a:p>
+                      <a:r>
+                        <a:rPr lang="en-GB" sz="800" b="0" dirty="0">
+                          <a:latin typeface="Times New Roman" panose="02020603050405020304" pitchFamily="18" charset="0"/>
+                          <a:cs typeface="Times New Roman" panose="02020603050405020304" pitchFamily="18" charset="0"/>
+                        </a:rPr>
                         <a:t>CA: 0.922, F1: 0.922</a:t>
                       </a:r>
-                    </a:p>
-                    <a:p>
-                      <a:endParaRPr lang="en-GB" sz="800" b="0" dirty="0">
-                        <a:latin typeface="Times New Roman" panose="02020603050405020304" pitchFamily="18" charset="0"/>
-                        <a:cs typeface="Times New Roman" panose="02020603050405020304" pitchFamily="18" charset="0"/>
-                      </a:endParaRPr>
                     </a:p>
                   </a:txBody>
                   <a:tcPr/>
@@ -4681,7 +4631,7 @@
                           <a:latin typeface="Times New Roman" panose="02020603050405020304" pitchFamily="18" charset="0"/>
                           <a:cs typeface="Times New Roman" panose="02020603050405020304" pitchFamily="18" charset="0"/>
                         </a:rPr>
-                        <a:t>CA: 0.883, F1: 0.883</a:t>
+                        <a:t>CA: 0.896, F1: 0.896</a:t>
                       </a:r>
                     </a:p>
                   </a:txBody>
@@ -4754,7 +4704,7 @@
                           <a:latin typeface="Times New Roman" panose="02020603050405020304" pitchFamily="18" charset="0"/>
                           <a:cs typeface="Times New Roman" panose="02020603050405020304" pitchFamily="18" charset="0"/>
                         </a:rPr>
-                        <a:t>CA: 0.649, F1: 0.645</a:t>
+                        <a:t>CA: 0.727, F1: 0.719</a:t>
                       </a:r>
                     </a:p>
                   </a:txBody>
@@ -4826,7 +4776,7 @@
                           <a:latin typeface="Times New Roman" panose="02020603050405020304" pitchFamily="18" charset="0"/>
                           <a:cs typeface="Times New Roman" panose="02020603050405020304" pitchFamily="18" charset="0"/>
                         </a:rPr>
-                        <a:t>CA: 0.701, F1: 0.699</a:t>
+                        <a:t>CA: 0.740, F1: 0.738</a:t>
                       </a:r>
                     </a:p>
                   </a:txBody>
@@ -4898,33 +4848,8 @@
                           <a:latin typeface="Times New Roman" panose="02020603050405020304" pitchFamily="18" charset="0"/>
                           <a:cs typeface="Times New Roman" panose="02020603050405020304" pitchFamily="18" charset="0"/>
                         </a:rPr>
-                        <a:t>CA</a:t>
-                      </a:r>
-                      <a:r>
-                        <a:rPr lang="en-GB" sz="800" b="0">
-                          <a:latin typeface="Times New Roman" panose="02020603050405020304" pitchFamily="18" charset="0"/>
-                          <a:cs typeface="Times New Roman" panose="02020603050405020304" pitchFamily="18" charset="0"/>
-                        </a:rPr>
-                        <a:t>: 0.831, </a:t>
-                      </a:r>
-                      <a:r>
-                        <a:rPr lang="en-GB" sz="800" b="0" dirty="0">
-                          <a:latin typeface="Times New Roman" panose="02020603050405020304" pitchFamily="18" charset="0"/>
-                          <a:cs typeface="Times New Roman" panose="02020603050405020304" pitchFamily="18" charset="0"/>
-                        </a:rPr>
-                        <a:t>F1</a:t>
-                      </a:r>
-                      <a:r>
-                        <a:rPr lang="en-GB" sz="800" b="0">
-                          <a:latin typeface="Times New Roman" panose="02020603050405020304" pitchFamily="18" charset="0"/>
-                          <a:cs typeface="Times New Roman" panose="02020603050405020304" pitchFamily="18" charset="0"/>
-                        </a:rPr>
-                        <a:t>: 0.832</a:t>
-                      </a:r>
-                      <a:endParaRPr lang="en-GB" sz="800" b="0" dirty="0">
-                        <a:latin typeface="Times New Roman" panose="02020603050405020304" pitchFamily="18" charset="0"/>
-                        <a:cs typeface="Times New Roman" panose="02020603050405020304" pitchFamily="18" charset="0"/>
-                      </a:endParaRPr>
+                        <a:t>CA: 0.831, F1: 0.832</a:t>
+                      </a:r>
                     </a:p>
                   </a:txBody>
                   <a:tcPr/>
@@ -4954,14 +4879,14 @@
           <p:nvPr>
             <p:extLst>
               <p:ext uri="{D42A27DB-BD31-4B8C-83A1-F6EECF244321}">
-                <p14:modId xmlns:p14="http://schemas.microsoft.com/office/powerpoint/2010/main" val="2188182026"/>
+                <p14:modId xmlns:p14="http://schemas.microsoft.com/office/powerpoint/2010/main" val="2779454812"/>
               </p:ext>
             </p:extLst>
           </p:nvPr>
         </p:nvGraphicFramePr>
         <p:xfrm>
-          <a:off x="358007" y="9102153"/>
-          <a:ext cx="4178298" cy="1155753"/>
+          <a:off x="276049" y="9724961"/>
+          <a:ext cx="4168836" cy="1155753"/>
         </p:xfrm>
         <a:graphic>
           <a:graphicData uri="http://schemas.openxmlformats.org/drawingml/2006/table">
@@ -4970,7 +4895,7 @@
                 <a:tableStyleId>{5C22544A-7EE6-4342-B048-85BDC9FD1C3A}</a:tableStyleId>
               </a:tblPr>
               <a:tblGrid>
-                <a:gridCol w="1392766">
+                <a:gridCol w="1383304">
                   <a:extLst>
                     <a:ext uri="{9D8B030D-6E8A-4147-A177-3AD203B41FA5}">
                       <a16:colId xmlns:a16="http://schemas.microsoft.com/office/drawing/2014/main" val="3385219870"/>
@@ -5013,7 +4938,7 @@
                     <a:p>
                       <a:r>
                         <a:rPr lang="en-GB" sz="1200" dirty="0"/>
-                        <a:t>Good</a:t>
+                        <a:t>False</a:t>
                       </a:r>
                     </a:p>
                   </a:txBody>
@@ -5026,7 +4951,7 @@
                     <a:p>
                       <a:r>
                         <a:rPr lang="en-GB" sz="1200" dirty="0"/>
-                        <a:t>Bad</a:t>
+                        <a:t>True</a:t>
                       </a:r>
                     </a:p>
                   </a:txBody>
@@ -5046,7 +4971,7 @@
                     <a:p>
                       <a:r>
                         <a:rPr lang="en-GB" sz="1200" dirty="0"/>
-                        <a:t>Good</a:t>
+                        <a:t>False</a:t>
                       </a:r>
                     </a:p>
                   </a:txBody>
@@ -5059,7 +4984,7 @@
                     <a:p>
                       <a:r>
                         <a:rPr lang="en-GB" sz="1200" dirty="0"/>
-                        <a:t>220</a:t>
+                        <a:t>29</a:t>
                       </a:r>
                     </a:p>
                   </a:txBody>
@@ -5072,7 +4997,7 @@
                     <a:p>
                       <a:r>
                         <a:rPr lang="en-GB" sz="1200" dirty="0"/>
-                        <a:t>25</a:t>
+                        <a:t>2</a:t>
                       </a:r>
                     </a:p>
                   </a:txBody>
@@ -5092,7 +5017,7 @@
                     <a:p>
                       <a:r>
                         <a:rPr lang="en-GB" sz="1200" dirty="0"/>
-                        <a:t>Bad</a:t>
+                        <a:t>True</a:t>
                       </a:r>
                     </a:p>
                   </a:txBody>
@@ -5105,7 +5030,7 @@
                     <a:p>
                       <a:r>
                         <a:rPr lang="en-GB" sz="1200" dirty="0"/>
-                        <a:t>32</a:t>
+                        <a:t>5</a:t>
                       </a:r>
                     </a:p>
                   </a:txBody>
@@ -5118,7 +5043,7 @@
                     <a:p>
                       <a:r>
                         <a:rPr lang="en-GB" sz="1200" dirty="0"/>
-                        <a:t>195</a:t>
+                        <a:t>41</a:t>
                       </a:r>
                     </a:p>
                   </a:txBody>
@@ -5149,14 +5074,14 @@
           <p:nvPr>
             <p:extLst>
               <p:ext uri="{D42A27DB-BD31-4B8C-83A1-F6EECF244321}">
-                <p14:modId xmlns:p14="http://schemas.microsoft.com/office/powerpoint/2010/main" val="1893544355"/>
+                <p14:modId xmlns:p14="http://schemas.microsoft.com/office/powerpoint/2010/main" val="3735690057"/>
               </p:ext>
             </p:extLst>
           </p:nvPr>
         </p:nvGraphicFramePr>
         <p:xfrm>
-          <a:off x="4830295" y="929598"/>
-          <a:ext cx="4617758" cy="4572000"/>
+          <a:off x="4830295" y="960063"/>
+          <a:ext cx="4617758" cy="4637427"/>
         </p:xfrm>
         <a:graphic>
           <a:graphicData uri="http://schemas.openxmlformats.org/drawingml/2006/table">
@@ -5179,14 +5104,14 @@
                     </a:ext>
                   </a:extLst>
                 </a:gridCol>
-                <a:gridCol w="524435">
+                <a:gridCol w="524436">
                   <a:extLst>
                     <a:ext uri="{9D8B030D-6E8A-4147-A177-3AD203B41FA5}">
                       <a16:colId xmlns:a16="http://schemas.microsoft.com/office/drawing/2014/main" val="1545408251"/>
                     </a:ext>
                   </a:extLst>
                 </a:gridCol>
-                <a:gridCol w="2946400">
+                <a:gridCol w="2946399">
                   <a:extLst>
                     <a:ext uri="{9D8B030D-6E8A-4147-A177-3AD203B41FA5}">
                       <a16:colId xmlns:a16="http://schemas.microsoft.com/office/drawing/2014/main" val="2530128174"/>
@@ -5194,7 +5119,7 @@
                   </a:extLst>
                 </a:gridCol>
               </a:tblGrid>
-              <a:tr h="322825">
+              <a:tr h="340078">
                 <a:tc>
                   <a:txBody>
                     <a:bodyPr/>
@@ -5303,7 +5228,7 @@
                   </a:ext>
                 </a:extLst>
               </a:tr>
-              <a:tr h="322825">
+              <a:tr h="340078">
                 <a:tc>
                   <a:txBody>
                     <a:bodyPr/>
@@ -5382,7 +5307,7 @@
                   </a:ext>
                 </a:extLst>
               </a:tr>
-              <a:tr h="322825">
+              <a:tr h="340078">
                 <a:tc>
                   <a:txBody>
                     <a:bodyPr/>
@@ -5461,7 +5386,7 @@
                   </a:ext>
                 </a:extLst>
               </a:tr>
-              <a:tr h="322825">
+              <a:tr h="340078">
                 <a:tc>
                   <a:txBody>
                     <a:bodyPr/>
@@ -5536,7 +5461,7 @@
                   </a:ext>
                 </a:extLst>
               </a:tr>
-              <a:tr h="322825">
+              <a:tr h="340078">
                 <a:tc>
                   <a:txBody>
                     <a:bodyPr/>
@@ -5628,7 +5553,7 @@
                   </a:ext>
                 </a:extLst>
               </a:tr>
-              <a:tr h="322825">
+              <a:tr h="340078">
                 <a:tc>
                   <a:txBody>
                     <a:bodyPr/>
@@ -5708,7 +5633,7 @@
                           <a:latin typeface="Times New Roman" panose="02020603050405020304" pitchFamily="18" charset="0"/>
                           <a:cs typeface="Times New Roman" panose="02020603050405020304" pitchFamily="18" charset="0"/>
                         </a:rPr>
-                        <a:t>Strong predictor for fire. Few instances of near outliers but still kept as they are in a scientifically possible range </a:t>
+                        <a:t>Strong predictor for fire. Few instances of near outliers but kept as they are in a scientifically possible range </a:t>
                       </a:r>
                     </a:p>
                   </a:txBody>
@@ -5720,7 +5645,7 @@
                   </a:ext>
                 </a:extLst>
               </a:tr>
-              <a:tr h="322825">
+              <a:tr h="340078">
                 <a:tc>
                   <a:txBody>
                     <a:bodyPr/>
@@ -5812,7 +5737,7 @@
                   </a:ext>
                 </a:extLst>
               </a:tr>
-              <a:tr h="322825">
+              <a:tr h="340078">
                 <a:tc>
                   <a:txBody>
                     <a:bodyPr/>
@@ -5921,7 +5846,7 @@
                   </a:ext>
                 </a:extLst>
               </a:tr>
-              <a:tr h="322825">
+              <a:tr h="340078">
                 <a:tc>
                   <a:txBody>
                     <a:bodyPr/>
@@ -6030,7 +5955,7 @@
                   </a:ext>
                 </a:extLst>
               </a:tr>
-              <a:tr h="322825">
+              <a:tr h="340078">
                 <a:tc>
                   <a:txBody>
                     <a:bodyPr/>
@@ -6139,7 +6064,7 @@
                   </a:ext>
                 </a:extLst>
               </a:tr>
-              <a:tr h="322825">
+              <a:tr h="340078">
                 <a:tc>
                   <a:txBody>
                     <a:bodyPr/>
@@ -6248,7 +6173,7 @@
                   </a:ext>
                 </a:extLst>
               </a:tr>
-              <a:tr h="322825">
+              <a:tr h="340078">
                 <a:tc>
                   <a:txBody>
                     <a:bodyPr/>
@@ -6357,7 +6282,7 @@
                   </a:ext>
                 </a:extLst>
               </a:tr>
-              <a:tr h="322825">
+              <a:tr h="340078">
                 <a:tc>
                   <a:txBody>
                     <a:bodyPr/>
@@ -6449,7 +6374,7 @@
                   </a:ext>
                 </a:extLst>
               </a:tr>
-              <a:tr h="205434">
+              <a:tr h="216413">
                 <a:tc>
                   <a:txBody>
                     <a:bodyPr/>
@@ -6542,8 +6467,8 @@
         </p:nvSpPr>
         <p:spPr>
           <a:xfrm>
-            <a:off x="4738741" y="5874930"/>
-            <a:ext cx="4709312" cy="923330"/>
+            <a:off x="4738742" y="5752397"/>
+            <a:ext cx="4709312" cy="1384995"/>
           </a:xfrm>
           <a:prstGeom prst="rect">
             <a:avLst/>
@@ -6557,10 +6482,12 @@
           <a:lstStyle/>
           <a:p>
             <a:r>
-              <a:rPr lang="en-US" dirty="0"/>
-              <a:t>Explain here how you chose the hyper parameter settings to explore and how you ran your experiments.</a:t>
+              <a:rPr lang="en-GB" sz="1200" dirty="0">
+                <a:latin typeface="Times New Roman" panose="02020603050405020304" pitchFamily="18" charset="0"/>
+                <a:cs typeface="Times New Roman" panose="02020603050405020304" pitchFamily="18" charset="0"/>
+              </a:rPr>
+              <a:t>For each model, I experimented with each settings and the setting with the best validation  F1 and CA were chosen. Tree based models performed best with 150 trees which makes sense for data about 500 rows is this number is not too overfitting or underfitting. Linear models performed best with the least changes with the standard settings. Gradient Boosting I chose 3 for depth limit and a learning rate of 0.1 to avoid overfitting. </a:t>
             </a:r>
-            <a:endParaRPr lang="en-GB" dirty="0"/>
           </a:p>
         </p:txBody>
       </p:sp>
@@ -6667,2527 +6594,6 @@
     <p:extLst>
       <p:ext uri="{BB962C8B-B14F-4D97-AF65-F5344CB8AC3E}">
         <p14:creationId xmlns:p14="http://schemas.microsoft.com/office/powerpoint/2010/main" val="1501710403"/>
-      </p:ext>
-    </p:extLst>
-  </p:cSld>
-  <p:clrMapOvr>
-    <a:masterClrMapping/>
-  </p:clrMapOvr>
-</p:sld>
-</file>
-
-<file path=ppt/slides/slide2.xml><?xml version="1.0" encoding="utf-8"?>
-<p:sld xmlns:a="http://schemas.openxmlformats.org/drawingml/2006/main" xmlns:r="http://schemas.openxmlformats.org/officeDocument/2006/relationships" xmlns:p="http://schemas.openxmlformats.org/presentationml/2006/main">
-  <p:cSld>
-    <p:spTree>
-      <p:nvGrpSpPr>
-        <p:cNvPr id="1" name=""/>
-        <p:cNvGrpSpPr/>
-        <p:nvPr/>
-      </p:nvGrpSpPr>
-      <p:grpSpPr>
-        <a:xfrm>
-          <a:off x="0" y="0"/>
-          <a:ext cx="0" cy="0"/>
-          <a:chOff x="0" y="0"/>
-          <a:chExt cx="0" cy="0"/>
-        </a:xfrm>
-      </p:grpSpPr>
-      <p:sp>
-        <p:nvSpPr>
-          <p:cNvPr id="18" name="TextBox 17">
-            <a:extLst>
-              <a:ext uri="{FF2B5EF4-FFF2-40B4-BE49-F238E27FC236}">
-                <a16:creationId xmlns:a16="http://schemas.microsoft.com/office/drawing/2014/main" id="{C388C717-AB61-4AA5-0065-CF8334987466}"/>
-              </a:ext>
-            </a:extLst>
-          </p:cNvPr>
-          <p:cNvSpPr txBox="1"/>
-          <p:nvPr/>
-        </p:nvSpPr>
-        <p:spPr>
-          <a:xfrm>
-            <a:off x="525101" y="6703042"/>
-            <a:ext cx="8848120" cy="2185214"/>
-          </a:xfrm>
-          <a:prstGeom prst="rect">
-            <a:avLst/>
-          </a:prstGeom>
-          <a:noFill/>
-          <a:ln w="38100">
-            <a:solidFill>
-              <a:schemeClr val="accent1">
-                <a:lumMod val="60000"/>
-                <a:lumOff val="40000"/>
-              </a:schemeClr>
-            </a:solidFill>
-          </a:ln>
-        </p:spPr>
-        <p:txBody>
-          <a:bodyPr wrap="square" lIns="91440" tIns="45720" rIns="91440" bIns="45720" anchor="t">
-            <a:spAutoFit/>
-          </a:bodyPr>
-          <a:lstStyle/>
-          <a:p>
-            <a:pPr marL="0" marR="0" lvl="0" indent="0" algn="l" defTabSz="1706910" rtl="0" eaLnBrk="1" fontAlgn="auto" latinLnBrk="0" hangingPunct="1">
-              <a:lnSpc>
-                <a:spcPct val="100000"/>
-              </a:lnSpc>
-              <a:spcBef>
-                <a:spcPts val="0"/>
-              </a:spcBef>
-              <a:spcAft>
-                <a:spcPts val="0"/>
-              </a:spcAft>
-              <a:buClrTx/>
-              <a:buSzTx/>
-              <a:buFontTx/>
-              <a:buNone/>
-              <a:tabLst/>
-              <a:defRPr/>
-            </a:pPr>
-            <a:r>
-              <a:rPr kumimoji="0" lang="en-GB" sz="2000" b="0" i="0" u="none" strike="noStrike" kern="1200" cap="none" spc="0" normalizeH="0" baseline="0" noProof="0" dirty="0">
-                <a:ln>
-                  <a:noFill/>
-                </a:ln>
-                <a:solidFill>
-                  <a:prstClr val="black"/>
-                </a:solidFill>
-                <a:effectLst/>
-                <a:uLnTx/>
-                <a:uFillTx/>
-                <a:latin typeface="Calibri" panose="020F0502020204030204"/>
-                <a:ea typeface="+mn-ea"/>
-                <a:cs typeface="+mn-cs"/>
-              </a:rPr>
-              <a:t>5. Model Training and Hyper Parameters</a:t>
-            </a:r>
-            <a:endParaRPr lang="en-GB" sz="2000" b="0" i="0" u="none" strike="noStrike" kern="1200" cap="none" spc="0" normalizeH="0" baseline="0" noProof="0">
-              <a:ln>
-                <a:noFill/>
-              </a:ln>
-              <a:solidFill>
-                <a:prstClr val="black"/>
-              </a:solidFill>
-              <a:effectLst/>
-              <a:uLnTx/>
-              <a:uFillTx/>
-              <a:latin typeface="Calibri" panose="020F0502020204030204"/>
-              <a:ea typeface="Calibri"/>
-              <a:cs typeface="Calibri"/>
-            </a:endParaRPr>
-          </a:p>
-          <a:p>
-            <a:pPr marL="0" marR="0" lvl="0" indent="0" algn="l" defTabSz="1706910" rtl="0" eaLnBrk="1" fontAlgn="auto" latinLnBrk="0" hangingPunct="1">
-              <a:lnSpc>
-                <a:spcPct val="100000"/>
-              </a:lnSpc>
-              <a:spcBef>
-                <a:spcPts val="0"/>
-              </a:spcBef>
-              <a:spcAft>
-                <a:spcPts val="0"/>
-              </a:spcAft>
-              <a:buClrTx/>
-              <a:buSzTx/>
-              <a:buFontTx/>
-              <a:buNone/>
-              <a:tabLst/>
-              <a:defRPr/>
-            </a:pPr>
-            <a:r>
-              <a:rPr kumimoji="0" lang="en-US" sz="1000" b="0" i="0" u="none" strike="noStrike" kern="1200" cap="none" spc="0" normalizeH="0" baseline="0" noProof="0" dirty="0">
-                <a:ln>
-                  <a:noFill/>
-                </a:ln>
-                <a:solidFill>
-                  <a:prstClr val="black"/>
-                </a:solidFill>
-                <a:effectLst/>
-                <a:uLnTx/>
-                <a:uFillTx/>
-                <a:latin typeface="Calibri" panose="020F0502020204030204"/>
-                <a:ea typeface="+mn-ea"/>
-                <a:cs typeface="+mn-cs"/>
-              </a:rPr>
-              <a:t>A table showing the different models and hyper parameters you trained, along with the correct metric for each; Add a sentence on how you chose the hyper parameter values. Make sure you name the metric correctly.</a:t>
-            </a:r>
-            <a:endParaRPr lang="en-US" sz="1000" b="0" i="0" u="none" strike="noStrike" kern="1200" cap="none" spc="0" normalizeH="0" baseline="0" noProof="0" dirty="0">
-              <a:ln>
-                <a:noFill/>
-              </a:ln>
-              <a:solidFill>
-                <a:prstClr val="black"/>
-              </a:solidFill>
-              <a:effectLst/>
-              <a:uLnTx/>
-              <a:uFillTx/>
-              <a:latin typeface="Calibri" panose="020F0502020204030204"/>
-              <a:ea typeface="Calibri"/>
-              <a:cs typeface="Calibri"/>
-            </a:endParaRPr>
-          </a:p>
-          <a:p>
-            <a:pPr marL="0" marR="0" lvl="0" indent="0" algn="l" defTabSz="1706910" rtl="0" eaLnBrk="1" fontAlgn="auto" latinLnBrk="0" hangingPunct="1">
-              <a:lnSpc>
-                <a:spcPct val="100000"/>
-              </a:lnSpc>
-              <a:spcBef>
-                <a:spcPts val="0"/>
-              </a:spcBef>
-              <a:spcAft>
-                <a:spcPts val="0"/>
-              </a:spcAft>
-              <a:buClrTx/>
-              <a:buSzTx/>
-              <a:buFontTx/>
-              <a:buNone/>
-              <a:tabLst/>
-              <a:defRPr/>
-            </a:pPr>
-            <a:endParaRPr lang="en-US" sz="1200" dirty="0">
-              <a:solidFill>
-                <a:prstClr val="black"/>
-              </a:solidFill>
-              <a:latin typeface="Calibri" panose="020F0502020204030204"/>
-            </a:endParaRPr>
-          </a:p>
-          <a:p>
-            <a:pPr marL="0" marR="0" lvl="0" indent="0" algn="l" defTabSz="1706910" rtl="0" eaLnBrk="1" fontAlgn="auto" latinLnBrk="0" hangingPunct="1">
-              <a:lnSpc>
-                <a:spcPct val="100000"/>
-              </a:lnSpc>
-              <a:spcBef>
-                <a:spcPts val="0"/>
-              </a:spcBef>
-              <a:spcAft>
-                <a:spcPts val="0"/>
-              </a:spcAft>
-              <a:buClrTx/>
-              <a:buSzTx/>
-              <a:buFontTx/>
-              <a:buNone/>
-              <a:tabLst/>
-              <a:defRPr/>
-            </a:pPr>
-            <a:endParaRPr kumimoji="0" lang="en-US" sz="1200" b="0" i="0" u="none" strike="noStrike" kern="1200" cap="none" spc="0" normalizeH="0" baseline="0" noProof="0" dirty="0">
-              <a:ln>
-                <a:noFill/>
-              </a:ln>
-              <a:solidFill>
-                <a:prstClr val="black"/>
-              </a:solidFill>
-              <a:effectLst/>
-              <a:uLnTx/>
-              <a:uFillTx/>
-              <a:latin typeface="Calibri" panose="020F0502020204030204"/>
-              <a:ea typeface="+mn-ea"/>
-              <a:cs typeface="+mn-cs"/>
-            </a:endParaRPr>
-          </a:p>
-          <a:p>
-            <a:pPr marL="0" marR="0" lvl="0" indent="0" algn="l" defTabSz="1706910" rtl="0" eaLnBrk="1" fontAlgn="auto" latinLnBrk="0" hangingPunct="1">
-              <a:lnSpc>
-                <a:spcPct val="100000"/>
-              </a:lnSpc>
-              <a:spcBef>
-                <a:spcPts val="0"/>
-              </a:spcBef>
-              <a:spcAft>
-                <a:spcPts val="0"/>
-              </a:spcAft>
-              <a:buClrTx/>
-              <a:buSzTx/>
-              <a:buFontTx/>
-              <a:buNone/>
-              <a:tabLst/>
-              <a:defRPr/>
-            </a:pPr>
-            <a:endParaRPr lang="en-US" sz="1200" dirty="0">
-              <a:solidFill>
-                <a:prstClr val="black"/>
-              </a:solidFill>
-              <a:latin typeface="Calibri" panose="020F0502020204030204"/>
-            </a:endParaRPr>
-          </a:p>
-          <a:p>
-            <a:pPr marL="0" marR="0" lvl="0" indent="0" algn="l" defTabSz="1706910" rtl="0" eaLnBrk="1" fontAlgn="auto" latinLnBrk="0" hangingPunct="1">
-              <a:lnSpc>
-                <a:spcPct val="100000"/>
-              </a:lnSpc>
-              <a:spcBef>
-                <a:spcPts val="0"/>
-              </a:spcBef>
-              <a:spcAft>
-                <a:spcPts val="0"/>
-              </a:spcAft>
-              <a:buClrTx/>
-              <a:buSzTx/>
-              <a:buFontTx/>
-              <a:buNone/>
-              <a:tabLst/>
-              <a:defRPr/>
-            </a:pPr>
-            <a:endParaRPr kumimoji="0" lang="en-US" sz="1200" b="0" i="0" u="none" strike="noStrike" kern="1200" cap="none" spc="0" normalizeH="0" baseline="0" noProof="0" dirty="0">
-              <a:ln>
-                <a:noFill/>
-              </a:ln>
-              <a:solidFill>
-                <a:prstClr val="black"/>
-              </a:solidFill>
-              <a:effectLst/>
-              <a:uLnTx/>
-              <a:uFillTx/>
-              <a:latin typeface="Calibri" panose="020F0502020204030204"/>
-              <a:ea typeface="+mn-ea"/>
-              <a:cs typeface="+mn-cs"/>
-            </a:endParaRPr>
-          </a:p>
-          <a:p>
-            <a:pPr marL="0" marR="0" lvl="0" indent="0" algn="l" defTabSz="1706910" rtl="0" eaLnBrk="1" fontAlgn="auto" latinLnBrk="0" hangingPunct="1">
-              <a:lnSpc>
-                <a:spcPct val="100000"/>
-              </a:lnSpc>
-              <a:spcBef>
-                <a:spcPts val="0"/>
-              </a:spcBef>
-              <a:spcAft>
-                <a:spcPts val="0"/>
-              </a:spcAft>
-              <a:buClrTx/>
-              <a:buSzTx/>
-              <a:buFontTx/>
-              <a:buNone/>
-              <a:tabLst/>
-              <a:defRPr/>
-            </a:pPr>
-            <a:endParaRPr lang="en-US" sz="1200" dirty="0">
-              <a:solidFill>
-                <a:prstClr val="black"/>
-              </a:solidFill>
-              <a:latin typeface="Calibri" panose="020F0502020204030204"/>
-            </a:endParaRPr>
-          </a:p>
-          <a:p>
-            <a:pPr marL="0" marR="0" lvl="0" indent="0" algn="l" defTabSz="1706910" rtl="0" eaLnBrk="1" fontAlgn="auto" latinLnBrk="0" hangingPunct="1">
-              <a:lnSpc>
-                <a:spcPct val="100000"/>
-              </a:lnSpc>
-              <a:spcBef>
-                <a:spcPts val="0"/>
-              </a:spcBef>
-              <a:spcAft>
-                <a:spcPts val="0"/>
-              </a:spcAft>
-              <a:buClrTx/>
-              <a:buSzTx/>
-              <a:buFontTx/>
-              <a:buNone/>
-              <a:tabLst/>
-              <a:defRPr/>
-            </a:pPr>
-            <a:endParaRPr kumimoji="0" lang="en-US" sz="1200" b="0" i="0" u="none" strike="noStrike" kern="1200" cap="none" spc="0" normalizeH="0" baseline="0" noProof="0" dirty="0">
-              <a:ln>
-                <a:noFill/>
-              </a:ln>
-              <a:solidFill>
-                <a:prstClr val="black"/>
-              </a:solidFill>
-              <a:effectLst/>
-              <a:uLnTx/>
-              <a:uFillTx/>
-              <a:latin typeface="Calibri" panose="020F0502020204030204"/>
-              <a:ea typeface="+mn-ea"/>
-              <a:cs typeface="+mn-cs"/>
-            </a:endParaRPr>
-          </a:p>
-          <a:p>
-            <a:pPr marL="0" marR="0" lvl="0" indent="0" algn="l" defTabSz="1706910" rtl="0" eaLnBrk="1" fontAlgn="auto" latinLnBrk="0" hangingPunct="1">
-              <a:lnSpc>
-                <a:spcPct val="100000"/>
-              </a:lnSpc>
-              <a:spcBef>
-                <a:spcPts val="0"/>
-              </a:spcBef>
-              <a:spcAft>
-                <a:spcPts val="0"/>
-              </a:spcAft>
-              <a:buClrTx/>
-              <a:buSzTx/>
-              <a:buFontTx/>
-              <a:buNone/>
-              <a:tabLst/>
-              <a:defRPr/>
-            </a:pPr>
-            <a:endParaRPr lang="en-US" sz="1200" dirty="0">
-              <a:solidFill>
-                <a:prstClr val="black"/>
-              </a:solidFill>
-              <a:latin typeface="Calibri" panose="020F0502020204030204"/>
-            </a:endParaRPr>
-          </a:p>
-          <a:p>
-            <a:pPr marL="0" marR="0" lvl="0" indent="0" algn="l" defTabSz="1706910" rtl="0" eaLnBrk="1" fontAlgn="auto" latinLnBrk="0" hangingPunct="1">
-              <a:lnSpc>
-                <a:spcPct val="100000"/>
-              </a:lnSpc>
-              <a:spcBef>
-                <a:spcPts val="0"/>
-              </a:spcBef>
-              <a:spcAft>
-                <a:spcPts val="0"/>
-              </a:spcAft>
-              <a:buClrTx/>
-              <a:buSzTx/>
-              <a:buFontTx/>
-              <a:buNone/>
-              <a:tabLst/>
-              <a:defRPr/>
-            </a:pPr>
-            <a:endParaRPr kumimoji="0" lang="en-US" sz="1200" b="0" i="0" u="none" strike="noStrike" kern="1200" cap="none" spc="0" normalizeH="0" baseline="0" noProof="0" dirty="0">
-              <a:ln>
-                <a:noFill/>
-              </a:ln>
-              <a:solidFill>
-                <a:prstClr val="black"/>
-              </a:solidFill>
-              <a:effectLst/>
-              <a:uLnTx/>
-              <a:uFillTx/>
-              <a:latin typeface="Calibri" panose="020F0502020204030204"/>
-              <a:ea typeface="+mn-ea"/>
-              <a:cs typeface="+mn-cs"/>
-            </a:endParaRPr>
-          </a:p>
-        </p:txBody>
-      </p:sp>
-      <p:sp>
-        <p:nvSpPr>
-          <p:cNvPr id="20" name="TextBox 19">
-            <a:extLst>
-              <a:ext uri="{FF2B5EF4-FFF2-40B4-BE49-F238E27FC236}">
-                <a16:creationId xmlns:a16="http://schemas.microsoft.com/office/drawing/2014/main" id="{5F922132-ED33-E59C-B714-DBB27B5DF6F8}"/>
-              </a:ext>
-            </a:extLst>
-          </p:cNvPr>
-          <p:cNvSpPr txBox="1"/>
-          <p:nvPr/>
-        </p:nvSpPr>
-        <p:spPr>
-          <a:xfrm>
-            <a:off x="475353" y="8816780"/>
-            <a:ext cx="8831538" cy="2015936"/>
-          </a:xfrm>
-          <a:prstGeom prst="rect">
-            <a:avLst/>
-          </a:prstGeom>
-          <a:noFill/>
-          <a:ln w="38100">
-            <a:solidFill>
-              <a:schemeClr val="accent1">
-                <a:lumMod val="60000"/>
-                <a:lumOff val="40000"/>
-              </a:schemeClr>
-            </a:solidFill>
-          </a:ln>
-        </p:spPr>
-        <p:txBody>
-          <a:bodyPr wrap="square" lIns="91440" tIns="45720" rIns="91440" bIns="45720" anchor="t">
-            <a:spAutoFit/>
-          </a:bodyPr>
-          <a:lstStyle/>
-          <a:p>
-            <a:pPr marL="0" marR="0" lvl="0" indent="0" algn="l" defTabSz="1706910" rtl="0" eaLnBrk="1" fontAlgn="auto" latinLnBrk="0" hangingPunct="1">
-              <a:lnSpc>
-                <a:spcPct val="100000"/>
-              </a:lnSpc>
-              <a:spcBef>
-                <a:spcPts val="0"/>
-              </a:spcBef>
-              <a:spcAft>
-                <a:spcPts val="0"/>
-              </a:spcAft>
-              <a:buClrTx/>
-              <a:buSzTx/>
-              <a:buFontTx/>
-              <a:buNone/>
-              <a:tabLst/>
-              <a:defRPr/>
-            </a:pPr>
-            <a:r>
-              <a:rPr kumimoji="0" lang="en-GB" sz="2000" b="0" i="0" u="none" strike="noStrike" kern="1200" cap="none" spc="0" normalizeH="0" baseline="0" noProof="0" dirty="0">
-                <a:ln>
-                  <a:noFill/>
-                </a:ln>
-                <a:solidFill>
-                  <a:prstClr val="black"/>
-                </a:solidFill>
-                <a:effectLst/>
-                <a:uLnTx/>
-                <a:uFillTx/>
-                <a:latin typeface="Calibri" panose="020F0502020204030204"/>
-                <a:ea typeface="+mn-ea"/>
-                <a:cs typeface="+mn-cs"/>
-              </a:rPr>
-              <a:t>6. Final Model and Results</a:t>
-            </a:r>
-          </a:p>
-          <a:p>
-            <a:pPr marL="0" marR="0" lvl="0" indent="0" algn="l" defTabSz="1706910" rtl="0" eaLnBrk="1" fontAlgn="auto" latinLnBrk="0" hangingPunct="1">
-              <a:lnSpc>
-                <a:spcPct val="100000"/>
-              </a:lnSpc>
-              <a:spcBef>
-                <a:spcPts val="0"/>
-              </a:spcBef>
-              <a:spcAft>
-                <a:spcPts val="0"/>
-              </a:spcAft>
-              <a:buClrTx/>
-              <a:buSzTx/>
-              <a:buFontTx/>
-              <a:buNone/>
-              <a:tabLst/>
-              <a:defRPr/>
-            </a:pPr>
-            <a:r>
-              <a:rPr kumimoji="0" lang="en-GB" sz="1050" b="0" i="0" u="none" strike="noStrike" kern="1200" cap="none" spc="0" normalizeH="0" baseline="0" noProof="0" dirty="0">
-                <a:ln>
-                  <a:noFill/>
-                </a:ln>
-                <a:solidFill>
-                  <a:prstClr val="black"/>
-                </a:solidFill>
-                <a:effectLst/>
-                <a:uLnTx/>
-                <a:uFillTx/>
-                <a:latin typeface="Calibri" panose="020F0502020204030204"/>
-                <a:ea typeface="+mn-ea"/>
-                <a:cs typeface="+mn-cs"/>
-              </a:rPr>
-              <a:t>Say how you chose the final model to test, and how you trained that model.</a:t>
-            </a:r>
-            <a:endParaRPr lang="en-GB" sz="1050" b="0" i="0" u="none" strike="noStrike" kern="1200" cap="none" spc="0" normalizeH="0" baseline="0" noProof="0" dirty="0">
-              <a:ln>
-                <a:noFill/>
-              </a:ln>
-              <a:solidFill>
-                <a:prstClr val="black"/>
-              </a:solidFill>
-              <a:effectLst/>
-              <a:uLnTx/>
-              <a:uFillTx/>
-              <a:latin typeface="Calibri" panose="020F0502020204030204"/>
-              <a:ea typeface="Calibri"/>
-              <a:cs typeface="Calibri"/>
-            </a:endParaRPr>
-          </a:p>
-          <a:p>
-            <a:pPr marL="0" marR="0" lvl="0" indent="0" algn="l" defTabSz="1706910" rtl="0" eaLnBrk="1" fontAlgn="auto" latinLnBrk="0" hangingPunct="1">
-              <a:lnSpc>
-                <a:spcPct val="100000"/>
-              </a:lnSpc>
-              <a:spcBef>
-                <a:spcPts val="0"/>
-              </a:spcBef>
-              <a:spcAft>
-                <a:spcPts val="0"/>
-              </a:spcAft>
-              <a:buClrTx/>
-              <a:buSzTx/>
-              <a:buFontTx/>
-              <a:buNone/>
-              <a:tabLst/>
-              <a:defRPr/>
-            </a:pPr>
-            <a:r>
-              <a:rPr kumimoji="0" lang="en-GB" sz="1050" b="0" i="0" u="none" strike="noStrike" kern="1200" cap="none" spc="0" normalizeH="0" baseline="0" noProof="0" dirty="0">
-                <a:ln>
-                  <a:noFill/>
-                </a:ln>
-                <a:solidFill>
-                  <a:prstClr val="black"/>
-                </a:solidFill>
-                <a:effectLst/>
-                <a:uLnTx/>
-                <a:uFillTx/>
-                <a:latin typeface="Calibri" panose="020F0502020204030204"/>
-                <a:ea typeface="+mn-ea"/>
-                <a:cs typeface="+mn-cs"/>
-              </a:rPr>
-              <a:t>Put the confusion matrix here</a:t>
-            </a:r>
-            <a:endParaRPr lang="en-GB" sz="1050" b="0" i="0" u="none" strike="noStrike" kern="1200" cap="none" spc="0" normalizeH="0" baseline="0" noProof="0" dirty="0">
-              <a:ln>
-                <a:noFill/>
-              </a:ln>
-              <a:solidFill>
-                <a:prstClr val="black"/>
-              </a:solidFill>
-              <a:effectLst/>
-              <a:uLnTx/>
-              <a:uFillTx/>
-              <a:latin typeface="Calibri" panose="020F0502020204030204"/>
-              <a:ea typeface="Calibri"/>
-              <a:cs typeface="Calibri"/>
-            </a:endParaRPr>
-          </a:p>
-          <a:p>
-            <a:pPr marL="0" marR="0" lvl="0" indent="0" algn="l" defTabSz="1706910" rtl="0" eaLnBrk="1" fontAlgn="auto" latinLnBrk="0" hangingPunct="1">
-              <a:lnSpc>
-                <a:spcPct val="100000"/>
-              </a:lnSpc>
-              <a:spcBef>
-                <a:spcPts val="0"/>
-              </a:spcBef>
-              <a:spcAft>
-                <a:spcPts val="0"/>
-              </a:spcAft>
-              <a:buClrTx/>
-              <a:buSzTx/>
-              <a:buFontTx/>
-              <a:buNone/>
-              <a:tabLst/>
-              <a:defRPr/>
-            </a:pPr>
-            <a:endParaRPr kumimoji="0" lang="en-GB" sz="1200" b="0" i="0" u="none" strike="noStrike" kern="1200" cap="none" spc="0" normalizeH="0" baseline="0" noProof="0" dirty="0">
-              <a:ln>
-                <a:noFill/>
-              </a:ln>
-              <a:solidFill>
-                <a:prstClr val="black"/>
-              </a:solidFill>
-              <a:effectLst/>
-              <a:uLnTx/>
-              <a:uFillTx/>
-              <a:latin typeface="Calibri" panose="020F0502020204030204"/>
-              <a:ea typeface="+mn-ea"/>
-              <a:cs typeface="+mn-cs"/>
-            </a:endParaRPr>
-          </a:p>
-          <a:p>
-            <a:pPr marL="0" marR="0" lvl="0" indent="0" algn="l" defTabSz="1706910" rtl="0" eaLnBrk="1" fontAlgn="auto" latinLnBrk="0" hangingPunct="1">
-              <a:lnSpc>
-                <a:spcPct val="100000"/>
-              </a:lnSpc>
-              <a:spcBef>
-                <a:spcPts val="0"/>
-              </a:spcBef>
-              <a:spcAft>
-                <a:spcPts val="0"/>
-              </a:spcAft>
-              <a:buClrTx/>
-              <a:buSzTx/>
-              <a:buFontTx/>
-              <a:buNone/>
-              <a:tabLst/>
-              <a:defRPr/>
-            </a:pPr>
-            <a:endParaRPr kumimoji="0" lang="en-GB" sz="1200" b="0" i="0" u="none" strike="noStrike" kern="1200" cap="none" spc="0" normalizeH="0" baseline="0" noProof="0" dirty="0">
-              <a:ln>
-                <a:noFill/>
-              </a:ln>
-              <a:solidFill>
-                <a:prstClr val="black"/>
-              </a:solidFill>
-              <a:effectLst/>
-              <a:uLnTx/>
-              <a:uFillTx/>
-              <a:latin typeface="Calibri" panose="020F0502020204030204"/>
-              <a:ea typeface="+mn-ea"/>
-              <a:cs typeface="+mn-cs"/>
-            </a:endParaRPr>
-          </a:p>
-          <a:p>
-            <a:pPr marL="0" marR="0" lvl="0" indent="0" algn="l" defTabSz="1706910" rtl="0" eaLnBrk="1" fontAlgn="auto" latinLnBrk="0" hangingPunct="1">
-              <a:lnSpc>
-                <a:spcPct val="100000"/>
-              </a:lnSpc>
-              <a:spcBef>
-                <a:spcPts val="0"/>
-              </a:spcBef>
-              <a:spcAft>
-                <a:spcPts val="0"/>
-              </a:spcAft>
-              <a:buClrTx/>
-              <a:buSzTx/>
-              <a:buFontTx/>
-              <a:buNone/>
-              <a:tabLst/>
-              <a:defRPr/>
-            </a:pPr>
-            <a:endParaRPr kumimoji="0" lang="en-GB" sz="1200" b="0" i="0" u="none" strike="noStrike" kern="1200" cap="none" spc="0" normalizeH="0" baseline="0" noProof="0" dirty="0">
-              <a:ln>
-                <a:noFill/>
-              </a:ln>
-              <a:solidFill>
-                <a:prstClr val="black"/>
-              </a:solidFill>
-              <a:effectLst/>
-              <a:uLnTx/>
-              <a:uFillTx/>
-              <a:latin typeface="Calibri" panose="020F0502020204030204"/>
-              <a:ea typeface="+mn-ea"/>
-              <a:cs typeface="+mn-cs"/>
-            </a:endParaRPr>
-          </a:p>
-          <a:p>
-            <a:pPr marL="0" marR="0" lvl="0" indent="0" algn="l" defTabSz="1706910" rtl="0" eaLnBrk="1" fontAlgn="auto" latinLnBrk="0" hangingPunct="1">
-              <a:lnSpc>
-                <a:spcPct val="100000"/>
-              </a:lnSpc>
-              <a:spcBef>
-                <a:spcPts val="0"/>
-              </a:spcBef>
-              <a:spcAft>
-                <a:spcPts val="0"/>
-              </a:spcAft>
-              <a:buClrTx/>
-              <a:buSzTx/>
-              <a:buFontTx/>
-              <a:buNone/>
-              <a:tabLst/>
-              <a:defRPr/>
-            </a:pPr>
-            <a:endParaRPr kumimoji="0" lang="en-GB" sz="1200" b="0" i="0" u="none" strike="noStrike" kern="1200" cap="none" spc="0" normalizeH="0" baseline="0" noProof="0" dirty="0">
-              <a:ln>
-                <a:noFill/>
-              </a:ln>
-              <a:solidFill>
-                <a:prstClr val="black"/>
-              </a:solidFill>
-              <a:effectLst/>
-              <a:uLnTx/>
-              <a:uFillTx/>
-              <a:latin typeface="Calibri" panose="020F0502020204030204"/>
-              <a:ea typeface="+mn-ea"/>
-              <a:cs typeface="+mn-cs"/>
-            </a:endParaRPr>
-          </a:p>
-          <a:p>
-            <a:pPr marL="0" marR="0" lvl="0" indent="0" algn="l" defTabSz="1706910" rtl="0" eaLnBrk="1" fontAlgn="auto" latinLnBrk="0" hangingPunct="1">
-              <a:lnSpc>
-                <a:spcPct val="100000"/>
-              </a:lnSpc>
-              <a:spcBef>
-                <a:spcPts val="0"/>
-              </a:spcBef>
-              <a:spcAft>
-                <a:spcPts val="0"/>
-              </a:spcAft>
-              <a:buClrTx/>
-              <a:buSzTx/>
-              <a:buFontTx/>
-              <a:buNone/>
-              <a:tabLst/>
-              <a:defRPr/>
-            </a:pPr>
-            <a:endParaRPr kumimoji="0" lang="en-GB" sz="1200" b="0" i="0" u="none" strike="noStrike" kern="1200" cap="none" spc="0" normalizeH="0" baseline="0" noProof="0" dirty="0">
-              <a:ln>
-                <a:noFill/>
-              </a:ln>
-              <a:solidFill>
-                <a:prstClr val="black"/>
-              </a:solidFill>
-              <a:effectLst/>
-              <a:uLnTx/>
-              <a:uFillTx/>
-              <a:latin typeface="Calibri" panose="020F0502020204030204"/>
-              <a:ea typeface="+mn-ea"/>
-              <a:cs typeface="+mn-cs"/>
-            </a:endParaRPr>
-          </a:p>
-          <a:p>
-            <a:pPr marL="0" marR="0" lvl="0" indent="0" algn="l" defTabSz="1706910" rtl="0" eaLnBrk="1" fontAlgn="auto" latinLnBrk="0" hangingPunct="1">
-              <a:lnSpc>
-                <a:spcPct val="100000"/>
-              </a:lnSpc>
-              <a:spcBef>
-                <a:spcPts val="0"/>
-              </a:spcBef>
-              <a:spcAft>
-                <a:spcPts val="0"/>
-              </a:spcAft>
-              <a:buClrTx/>
-              <a:buSzTx/>
-              <a:buFontTx/>
-              <a:buNone/>
-              <a:tabLst/>
-              <a:defRPr/>
-            </a:pPr>
-            <a:endParaRPr kumimoji="0" lang="en-GB" sz="1200" b="0" i="0" u="none" strike="noStrike" kern="1200" cap="none" spc="0" normalizeH="0" baseline="0" noProof="0" dirty="0">
-              <a:ln>
-                <a:noFill/>
-              </a:ln>
-              <a:solidFill>
-                <a:prstClr val="black"/>
-              </a:solidFill>
-              <a:effectLst/>
-              <a:uLnTx/>
-              <a:uFillTx/>
-              <a:latin typeface="Calibri" panose="020F0502020204030204"/>
-              <a:ea typeface="+mn-ea"/>
-              <a:cs typeface="+mn-cs"/>
-            </a:endParaRPr>
-          </a:p>
-          <a:p>
-            <a:pPr marL="0" marR="0" lvl="0" indent="0" algn="l" defTabSz="1706910" rtl="0" eaLnBrk="1" fontAlgn="auto" latinLnBrk="0" hangingPunct="1">
-              <a:lnSpc>
-                <a:spcPct val="100000"/>
-              </a:lnSpc>
-              <a:spcBef>
-                <a:spcPts val="0"/>
-              </a:spcBef>
-              <a:spcAft>
-                <a:spcPts val="0"/>
-              </a:spcAft>
-              <a:buClrTx/>
-              <a:buSzTx/>
-              <a:buFontTx/>
-              <a:buNone/>
-              <a:tabLst/>
-              <a:defRPr/>
-            </a:pPr>
-            <a:endParaRPr kumimoji="0" lang="en-GB" sz="1200" b="0" i="0" u="none" strike="noStrike" kern="1200" cap="none" spc="0" normalizeH="0" baseline="0" noProof="0" dirty="0">
-              <a:ln>
-                <a:noFill/>
-              </a:ln>
-              <a:solidFill>
-                <a:prstClr val="black"/>
-              </a:solidFill>
-              <a:effectLst/>
-              <a:uLnTx/>
-              <a:uFillTx/>
-              <a:latin typeface="Calibri" panose="020F0502020204030204"/>
-              <a:ea typeface="+mn-ea"/>
-              <a:cs typeface="+mn-cs"/>
-            </a:endParaRPr>
-          </a:p>
-        </p:txBody>
-      </p:sp>
-      <p:sp>
-        <p:nvSpPr>
-          <p:cNvPr id="6" name="TextBox 5">
-            <a:extLst>
-              <a:ext uri="{FF2B5EF4-FFF2-40B4-BE49-F238E27FC236}">
-                <a16:creationId xmlns:a16="http://schemas.microsoft.com/office/drawing/2014/main" id="{8AF6D823-6DA6-9959-0DCB-CCA6AD2DD76E}"/>
-              </a:ext>
-            </a:extLst>
-          </p:cNvPr>
-          <p:cNvSpPr txBox="1"/>
-          <p:nvPr/>
-        </p:nvSpPr>
-        <p:spPr>
-          <a:xfrm>
-            <a:off x="540612" y="12021739"/>
-            <a:ext cx="4884758" cy="553998"/>
-          </a:xfrm>
-          <a:prstGeom prst="rect">
-            <a:avLst/>
-          </a:prstGeom>
-          <a:noFill/>
-          <a:ln w="38100">
-            <a:solidFill>
-              <a:schemeClr val="accent1">
-                <a:lumMod val="60000"/>
-                <a:lumOff val="40000"/>
-              </a:schemeClr>
-            </a:solidFill>
-          </a:ln>
-        </p:spPr>
-        <p:txBody>
-          <a:bodyPr wrap="square" lIns="91440" tIns="45720" rIns="91440" bIns="45720" rtlCol="0" anchor="t">
-            <a:spAutoFit/>
-          </a:bodyPr>
-          <a:lstStyle/>
-          <a:p>
-            <a:r>
-              <a:rPr lang="en-GB" dirty="0"/>
-              <a:t>8. References</a:t>
-            </a:r>
-          </a:p>
-          <a:p>
-            <a:r>
-              <a:rPr lang="en-GB" sz="1200" b="0" i="0" dirty="0">
-                <a:solidFill>
-                  <a:srgbClr val="202122"/>
-                </a:solidFill>
-                <a:effectLst/>
-                <a:latin typeface="Arial" panose="020B0604020202020204" pitchFamily="34" charset="0"/>
-              </a:rPr>
-              <a:t>[1] If you reference any papers or websites, list them here</a:t>
-            </a:r>
-            <a:endParaRPr lang="en-GB" dirty="0"/>
-          </a:p>
-        </p:txBody>
-      </p:sp>
-      <p:graphicFrame>
-        <p:nvGraphicFramePr>
-          <p:cNvPr id="7" name="Table 7">
-            <a:extLst>
-              <a:ext uri="{FF2B5EF4-FFF2-40B4-BE49-F238E27FC236}">
-                <a16:creationId xmlns:a16="http://schemas.microsoft.com/office/drawing/2014/main" id="{FBE95B7C-B010-6D30-1BB3-D0BB1817071D}"/>
-              </a:ext>
-            </a:extLst>
-          </p:cNvPr>
-          <p:cNvGraphicFramePr>
-            <a:graphicFrameLocks noGrp="1"/>
-          </p:cNvGraphicFramePr>
-          <p:nvPr>
-            <p:extLst>
-              <p:ext uri="{D42A27DB-BD31-4B8C-83A1-F6EECF244321}">
-                <p14:modId xmlns:p14="http://schemas.microsoft.com/office/powerpoint/2010/main" val="11063398"/>
-              </p:ext>
-            </p:extLst>
-          </p:nvPr>
-        </p:nvGraphicFramePr>
-        <p:xfrm>
-          <a:off x="4775726" y="6931436"/>
-          <a:ext cx="4443504" cy="1737360"/>
-        </p:xfrm>
-        <a:graphic>
-          <a:graphicData uri="http://schemas.openxmlformats.org/drawingml/2006/table">
-            <a:tbl>
-              <a:tblPr firstRow="1" bandRow="1">
-                <a:tableStyleId>{5C22544A-7EE6-4342-B048-85BDC9FD1C3A}</a:tableStyleId>
-              </a:tblPr>
-              <a:tblGrid>
-                <a:gridCol w="1481168">
-                  <a:extLst>
-                    <a:ext uri="{9D8B030D-6E8A-4147-A177-3AD203B41FA5}">
-                      <a16:colId xmlns:a16="http://schemas.microsoft.com/office/drawing/2014/main" val="1907166431"/>
-                    </a:ext>
-                  </a:extLst>
-                </a:gridCol>
-                <a:gridCol w="1865917">
-                  <a:extLst>
-                    <a:ext uri="{9D8B030D-6E8A-4147-A177-3AD203B41FA5}">
-                      <a16:colId xmlns:a16="http://schemas.microsoft.com/office/drawing/2014/main" val="3484362391"/>
-                    </a:ext>
-                  </a:extLst>
-                </a:gridCol>
-                <a:gridCol w="1096419">
-                  <a:extLst>
-                    <a:ext uri="{9D8B030D-6E8A-4147-A177-3AD203B41FA5}">
-                      <a16:colId xmlns:a16="http://schemas.microsoft.com/office/drawing/2014/main" val="326053815"/>
-                    </a:ext>
-                  </a:extLst>
-                </a:gridCol>
-              </a:tblGrid>
-              <a:tr h="561889">
-                <a:tc>
-                  <a:txBody>
-                    <a:bodyPr/>
-                    <a:lstStyle/>
-                    <a:p>
-                      <a:r>
-                        <a:rPr lang="en-GB" sz="1800" dirty="0"/>
-                        <a:t>Model</a:t>
-                      </a:r>
-                    </a:p>
-                  </a:txBody>
-                  <a:tcPr/>
-                </a:tc>
-                <a:tc>
-                  <a:txBody>
-                    <a:bodyPr/>
-                    <a:lstStyle/>
-                    <a:p>
-                      <a:r>
-                        <a:rPr lang="en-GB" sz="1800" dirty="0"/>
-                        <a:t>Hyper Parameters</a:t>
-                      </a:r>
-                    </a:p>
-                  </a:txBody>
-                  <a:tcPr/>
-                </a:tc>
-                <a:tc>
-                  <a:txBody>
-                    <a:bodyPr/>
-                    <a:lstStyle/>
-                    <a:p>
-                      <a:r>
-                        <a:rPr lang="en-GB" sz="1800" dirty="0"/>
-                        <a:t>Validation Metric</a:t>
-                      </a:r>
-                    </a:p>
-                  </a:txBody>
-                  <a:tcPr/>
-                </a:tc>
-                <a:extLst>
-                  <a:ext uri="{0D108BD9-81ED-4DB2-BD59-A6C34878D82A}">
-                    <a16:rowId xmlns:a16="http://schemas.microsoft.com/office/drawing/2014/main" val="3158663126"/>
-                  </a:ext>
-                </a:extLst>
-              </a:tr>
-              <a:tr h="268174">
-                <a:tc>
-                  <a:txBody>
-                    <a:bodyPr/>
-                    <a:lstStyle/>
-                    <a:p>
-                      <a:r>
-                        <a:rPr lang="en-US" sz="1200" dirty="0"/>
-                        <a:t>Model 1</a:t>
-                      </a:r>
-                      <a:endParaRPr lang="en-GB" sz="1200" dirty="0"/>
-                    </a:p>
-                  </a:txBody>
-                  <a:tcPr/>
-                </a:tc>
-                <a:tc>
-                  <a:txBody>
-                    <a:bodyPr/>
-                    <a:lstStyle/>
-                    <a:p>
-                      <a:r>
-                        <a:rPr lang="en-GB" sz="1200" dirty="0"/>
-                        <a:t>Hyper parameter list</a:t>
-                      </a:r>
-                    </a:p>
-                  </a:txBody>
-                  <a:tcPr/>
-                </a:tc>
-                <a:tc>
-                  <a:txBody>
-                    <a:bodyPr/>
-                    <a:lstStyle/>
-                    <a:p>
-                      <a:r>
-                        <a:rPr lang="en-GB" sz="1200" dirty="0"/>
-                        <a:t>A%</a:t>
-                      </a:r>
-                    </a:p>
-                  </a:txBody>
-                  <a:tcPr/>
-                </a:tc>
-                <a:extLst>
-                  <a:ext uri="{0D108BD9-81ED-4DB2-BD59-A6C34878D82A}">
-                    <a16:rowId xmlns:a16="http://schemas.microsoft.com/office/drawing/2014/main" val="391472538"/>
-                  </a:ext>
-                </a:extLst>
-              </a:tr>
-              <a:tr h="242633">
-                <a:tc>
-                  <a:txBody>
-                    <a:bodyPr/>
-                    <a:lstStyle/>
-                    <a:p>
-                      <a:pPr marL="0" marR="0" lvl="0" indent="0" algn="l" defTabSz="1706910" rtl="0" eaLnBrk="1" fontAlgn="auto" latinLnBrk="0" hangingPunct="1">
-                        <a:lnSpc>
-                          <a:spcPct val="100000"/>
-                        </a:lnSpc>
-                        <a:spcBef>
-                          <a:spcPts val="0"/>
-                        </a:spcBef>
-                        <a:spcAft>
-                          <a:spcPts val="0"/>
-                        </a:spcAft>
-                        <a:buClrTx/>
-                        <a:buSzTx/>
-                        <a:buFontTx/>
-                        <a:buNone/>
-                        <a:tabLst/>
-                        <a:defRPr/>
-                      </a:pPr>
-                      <a:r>
-                        <a:rPr lang="en-US" sz="1200" dirty="0"/>
-                        <a:t>Model 2</a:t>
-                      </a:r>
-                      <a:endParaRPr lang="en-GB" sz="1200" dirty="0"/>
-                    </a:p>
-                  </a:txBody>
-                  <a:tcPr/>
-                </a:tc>
-                <a:tc>
-                  <a:txBody>
-                    <a:bodyPr/>
-                    <a:lstStyle/>
-                    <a:p>
-                      <a:r>
-                        <a:rPr lang="en-GB" sz="1200" dirty="0"/>
-                        <a:t>Hyper parameter list</a:t>
-                      </a:r>
-                    </a:p>
-                  </a:txBody>
-                  <a:tcPr/>
-                </a:tc>
-                <a:tc>
-                  <a:txBody>
-                    <a:bodyPr/>
-                    <a:lstStyle/>
-                    <a:p>
-                      <a:r>
-                        <a:rPr lang="en-GB" sz="1200" dirty="0"/>
-                        <a:t>B%</a:t>
-                      </a:r>
-                    </a:p>
-                  </a:txBody>
-                  <a:tcPr/>
-                </a:tc>
-                <a:extLst>
-                  <a:ext uri="{0D108BD9-81ED-4DB2-BD59-A6C34878D82A}">
-                    <a16:rowId xmlns:a16="http://schemas.microsoft.com/office/drawing/2014/main" val="3680307176"/>
-                  </a:ext>
-                </a:extLst>
-              </a:tr>
-              <a:tr h="242633">
-                <a:tc>
-                  <a:txBody>
-                    <a:bodyPr/>
-                    <a:lstStyle/>
-                    <a:p>
-                      <a:pPr marL="0" marR="0" lvl="0" indent="0" algn="l" defTabSz="1706910" rtl="0" eaLnBrk="1" fontAlgn="auto" latinLnBrk="0" hangingPunct="1">
-                        <a:lnSpc>
-                          <a:spcPct val="100000"/>
-                        </a:lnSpc>
-                        <a:spcBef>
-                          <a:spcPts val="0"/>
-                        </a:spcBef>
-                        <a:spcAft>
-                          <a:spcPts val="0"/>
-                        </a:spcAft>
-                        <a:buClrTx/>
-                        <a:buSzTx/>
-                        <a:buFontTx/>
-                        <a:buNone/>
-                        <a:tabLst/>
-                        <a:defRPr/>
-                      </a:pPr>
-                      <a:r>
-                        <a:rPr lang="en-US" sz="1200" dirty="0"/>
-                        <a:t>Model 3</a:t>
-                      </a:r>
-                      <a:endParaRPr lang="en-GB" sz="1200" dirty="0"/>
-                    </a:p>
-                  </a:txBody>
-                  <a:tcPr/>
-                </a:tc>
-                <a:tc>
-                  <a:txBody>
-                    <a:bodyPr/>
-                    <a:lstStyle/>
-                    <a:p>
-                      <a:r>
-                        <a:rPr lang="en-GB" sz="1200" dirty="0"/>
-                        <a:t>Hyper parameter list</a:t>
-                      </a:r>
-                    </a:p>
-                  </a:txBody>
-                  <a:tcPr/>
-                </a:tc>
-                <a:tc>
-                  <a:txBody>
-                    <a:bodyPr/>
-                    <a:lstStyle/>
-                    <a:p>
-                      <a:r>
-                        <a:rPr lang="en-GB" sz="1200" dirty="0"/>
-                        <a:t>C%</a:t>
-                      </a:r>
-                    </a:p>
-                  </a:txBody>
-                  <a:tcPr/>
-                </a:tc>
-                <a:extLst>
-                  <a:ext uri="{0D108BD9-81ED-4DB2-BD59-A6C34878D82A}">
-                    <a16:rowId xmlns:a16="http://schemas.microsoft.com/office/drawing/2014/main" val="1144539082"/>
-                  </a:ext>
-                </a:extLst>
-              </a:tr>
-              <a:tr h="242633">
-                <a:tc>
-                  <a:txBody>
-                    <a:bodyPr/>
-                    <a:lstStyle/>
-                    <a:p>
-                      <a:r>
-                        <a:rPr lang="en-US" sz="1200" dirty="0"/>
-                        <a:t>Model 4 ….</a:t>
-                      </a:r>
-                      <a:endParaRPr lang="en-GB" sz="1200" dirty="0"/>
-                    </a:p>
-                  </a:txBody>
-                  <a:tcPr/>
-                </a:tc>
-                <a:tc>
-                  <a:txBody>
-                    <a:bodyPr/>
-                    <a:lstStyle/>
-                    <a:p>
-                      <a:r>
-                        <a:rPr lang="en-GB" sz="1200" dirty="0"/>
-                        <a:t>Hyper parameter list</a:t>
-                      </a:r>
-                    </a:p>
-                  </a:txBody>
-                  <a:tcPr/>
-                </a:tc>
-                <a:tc>
-                  <a:txBody>
-                    <a:bodyPr/>
-                    <a:lstStyle/>
-                    <a:p>
-                      <a:r>
-                        <a:rPr lang="en-GB" sz="1200" dirty="0"/>
-                        <a:t>D%</a:t>
-                      </a:r>
-                    </a:p>
-                  </a:txBody>
-                  <a:tcPr/>
-                </a:tc>
-                <a:extLst>
-                  <a:ext uri="{0D108BD9-81ED-4DB2-BD59-A6C34878D82A}">
-                    <a16:rowId xmlns:a16="http://schemas.microsoft.com/office/drawing/2014/main" val="3656706315"/>
-                  </a:ext>
-                </a:extLst>
-              </a:tr>
-            </a:tbl>
-          </a:graphicData>
-        </a:graphic>
-      </p:graphicFrame>
-      <p:graphicFrame>
-        <p:nvGraphicFramePr>
-          <p:cNvPr id="2" name="Table 2">
-            <a:extLst>
-              <a:ext uri="{FF2B5EF4-FFF2-40B4-BE49-F238E27FC236}">
-                <a16:creationId xmlns:a16="http://schemas.microsoft.com/office/drawing/2014/main" id="{50697821-56EE-B522-2650-CAC52B000E80}"/>
-              </a:ext>
-            </a:extLst>
-          </p:cNvPr>
-          <p:cNvGraphicFramePr>
-            <a:graphicFrameLocks noGrp="1"/>
-          </p:cNvGraphicFramePr>
-          <p:nvPr>
-            <p:extLst>
-              <p:ext uri="{D42A27DB-BD31-4B8C-83A1-F6EECF244321}">
-                <p14:modId xmlns:p14="http://schemas.microsoft.com/office/powerpoint/2010/main" val="1738814142"/>
-              </p:ext>
-            </p:extLst>
-          </p:nvPr>
-        </p:nvGraphicFramePr>
-        <p:xfrm>
-          <a:off x="589137" y="9555928"/>
-          <a:ext cx="4178298" cy="1120548"/>
-        </p:xfrm>
-        <a:graphic>
-          <a:graphicData uri="http://schemas.openxmlformats.org/drawingml/2006/table">
-            <a:tbl>
-              <a:tblPr firstRow="1" bandRow="1">
-                <a:tableStyleId>{5C22544A-7EE6-4342-B048-85BDC9FD1C3A}</a:tableStyleId>
-              </a:tblPr>
-              <a:tblGrid>
-                <a:gridCol w="1392766">
-                  <a:extLst>
-                    <a:ext uri="{9D8B030D-6E8A-4147-A177-3AD203B41FA5}">
-                      <a16:colId xmlns:a16="http://schemas.microsoft.com/office/drawing/2014/main" val="3385219870"/>
-                    </a:ext>
-                  </a:extLst>
-                </a:gridCol>
-                <a:gridCol w="1392766">
-                  <a:extLst>
-                    <a:ext uri="{9D8B030D-6E8A-4147-A177-3AD203B41FA5}">
-                      <a16:colId xmlns:a16="http://schemas.microsoft.com/office/drawing/2014/main" val="2134976436"/>
-                    </a:ext>
-                  </a:extLst>
-                </a:gridCol>
-                <a:gridCol w="1392766">
-                  <a:extLst>
-                    <a:ext uri="{9D8B030D-6E8A-4147-A177-3AD203B41FA5}">
-                      <a16:colId xmlns:a16="http://schemas.microsoft.com/office/drawing/2014/main" val="629384850"/>
-                    </a:ext>
-                  </a:extLst>
-                </a:gridCol>
-              </a:tblGrid>
-              <a:tr h="370840">
-                <a:tc>
-                  <a:txBody>
-                    <a:bodyPr/>
-                    <a:lstStyle/>
-                    <a:p>
-                      <a:r>
-                        <a:rPr lang="en-GB" sz="1200" dirty="0"/>
-                        <a:t>Actual / Predicted</a:t>
-                      </a:r>
-                    </a:p>
-                  </a:txBody>
-                  <a:tcPr/>
-                </a:tc>
-                <a:tc>
-                  <a:txBody>
-                    <a:bodyPr/>
-                    <a:lstStyle/>
-                    <a:p>
-                      <a:r>
-                        <a:rPr lang="en-GB" sz="1200" dirty="0"/>
-                        <a:t>Good</a:t>
-                      </a:r>
-                    </a:p>
-                  </a:txBody>
-                  <a:tcPr/>
-                </a:tc>
-                <a:tc>
-                  <a:txBody>
-                    <a:bodyPr/>
-                    <a:lstStyle/>
-                    <a:p>
-                      <a:r>
-                        <a:rPr lang="en-GB" sz="1200" dirty="0"/>
-                        <a:t>Bad</a:t>
-                      </a:r>
-                    </a:p>
-                  </a:txBody>
-                  <a:tcPr/>
-                </a:tc>
-                <a:extLst>
-                  <a:ext uri="{0D108BD9-81ED-4DB2-BD59-A6C34878D82A}">
-                    <a16:rowId xmlns:a16="http://schemas.microsoft.com/office/drawing/2014/main" val="2126179801"/>
-                  </a:ext>
-                </a:extLst>
-              </a:tr>
-              <a:tr h="370840">
-                <a:tc>
-                  <a:txBody>
-                    <a:bodyPr/>
-                    <a:lstStyle/>
-                    <a:p>
-                      <a:r>
-                        <a:rPr lang="en-GB" sz="1200" dirty="0"/>
-                        <a:t>Good</a:t>
-                      </a:r>
-                    </a:p>
-                  </a:txBody>
-                  <a:tcPr/>
-                </a:tc>
-                <a:tc>
-                  <a:txBody>
-                    <a:bodyPr/>
-                    <a:lstStyle/>
-                    <a:p>
-                      <a:r>
-                        <a:rPr lang="en-GB" sz="1200" dirty="0"/>
-                        <a:t>X</a:t>
-                      </a:r>
-                    </a:p>
-                  </a:txBody>
-                  <a:tcPr/>
-                </a:tc>
-                <a:tc>
-                  <a:txBody>
-                    <a:bodyPr/>
-                    <a:lstStyle/>
-                    <a:p>
-                      <a:r>
-                        <a:rPr lang="en-US" sz="1200" dirty="0"/>
-                        <a:t>X</a:t>
-                      </a:r>
-                      <a:endParaRPr lang="en-GB" sz="1200" dirty="0"/>
-                    </a:p>
-                  </a:txBody>
-                  <a:tcPr/>
-                </a:tc>
-                <a:extLst>
-                  <a:ext uri="{0D108BD9-81ED-4DB2-BD59-A6C34878D82A}">
-                    <a16:rowId xmlns:a16="http://schemas.microsoft.com/office/drawing/2014/main" val="1186692526"/>
-                  </a:ext>
-                </a:extLst>
-              </a:tr>
-              <a:tr h="378868">
-                <a:tc>
-                  <a:txBody>
-                    <a:bodyPr/>
-                    <a:lstStyle/>
-                    <a:p>
-                      <a:r>
-                        <a:rPr lang="en-GB" sz="1200" dirty="0"/>
-                        <a:t>Bad</a:t>
-                      </a:r>
-                    </a:p>
-                  </a:txBody>
-                  <a:tcPr/>
-                </a:tc>
-                <a:tc>
-                  <a:txBody>
-                    <a:bodyPr/>
-                    <a:lstStyle/>
-                    <a:p>
-                      <a:r>
-                        <a:rPr lang="en-US" sz="1200" dirty="0"/>
-                        <a:t>X</a:t>
-                      </a:r>
-                      <a:endParaRPr lang="en-GB" sz="1200" dirty="0"/>
-                    </a:p>
-                  </a:txBody>
-                  <a:tcPr/>
-                </a:tc>
-                <a:tc>
-                  <a:txBody>
-                    <a:bodyPr/>
-                    <a:lstStyle/>
-                    <a:p>
-                      <a:r>
-                        <a:rPr lang="en-US" sz="1200" dirty="0"/>
-                        <a:t>X</a:t>
-                      </a:r>
-                      <a:endParaRPr lang="en-GB" sz="1200" dirty="0"/>
-                    </a:p>
-                  </a:txBody>
-                  <a:tcPr/>
-                </a:tc>
-                <a:extLst>
-                  <a:ext uri="{0D108BD9-81ED-4DB2-BD59-A6C34878D82A}">
-                    <a16:rowId xmlns:a16="http://schemas.microsoft.com/office/drawing/2014/main" val="788774926"/>
-                  </a:ext>
-                </a:extLst>
-              </a:tr>
-            </a:tbl>
-          </a:graphicData>
-        </a:graphic>
-      </p:graphicFrame>
-      <p:sp>
-        <p:nvSpPr>
-          <p:cNvPr id="8" name="TextBox 7">
-            <a:extLst>
-              <a:ext uri="{FF2B5EF4-FFF2-40B4-BE49-F238E27FC236}">
-                <a16:creationId xmlns:a16="http://schemas.microsoft.com/office/drawing/2014/main" id="{53F18AD2-7D7C-86A1-617F-5ED4C88C525F}"/>
-              </a:ext>
-            </a:extLst>
-          </p:cNvPr>
-          <p:cNvSpPr txBox="1"/>
-          <p:nvPr/>
-        </p:nvSpPr>
-        <p:spPr>
-          <a:xfrm>
-            <a:off x="358007" y="221862"/>
-            <a:ext cx="8885186" cy="523220"/>
-          </a:xfrm>
-          <a:prstGeom prst="rect">
-            <a:avLst/>
-          </a:prstGeom>
-          <a:noFill/>
-        </p:spPr>
-        <p:txBody>
-          <a:bodyPr wrap="square" lIns="91440" tIns="45720" rIns="91440" bIns="45720" rtlCol="0" anchor="t">
-            <a:spAutoFit/>
-          </a:bodyPr>
-          <a:lstStyle/>
-          <a:p>
-            <a:r>
-              <a:rPr lang="en-GB" sz="2800" dirty="0"/>
-              <a:t>CSCU9M5 Assignment 1. Student Number 3344671</a:t>
-            </a:r>
-            <a:endParaRPr lang="en-GB" sz="2800" dirty="0">
-              <a:ea typeface="Calibri" panose="020F0502020204030204"/>
-              <a:cs typeface="Calibri" panose="020F0502020204030204"/>
-            </a:endParaRPr>
-          </a:p>
-        </p:txBody>
-      </p:sp>
-      <p:graphicFrame>
-        <p:nvGraphicFramePr>
-          <p:cNvPr id="5" name="Table 9">
-            <a:extLst>
-              <a:ext uri="{FF2B5EF4-FFF2-40B4-BE49-F238E27FC236}">
-                <a16:creationId xmlns:a16="http://schemas.microsoft.com/office/drawing/2014/main" id="{D4D093B8-47C2-E43F-6BF0-1D763DE45341}"/>
-              </a:ext>
-            </a:extLst>
-          </p:cNvPr>
-          <p:cNvGraphicFramePr>
-            <a:graphicFrameLocks noGrp="1"/>
-          </p:cNvGraphicFramePr>
-          <p:nvPr>
-            <p:extLst>
-              <p:ext uri="{D42A27DB-BD31-4B8C-83A1-F6EECF244321}">
-                <p14:modId xmlns:p14="http://schemas.microsoft.com/office/powerpoint/2010/main" val="2191066046"/>
-              </p:ext>
-            </p:extLst>
-          </p:nvPr>
-        </p:nvGraphicFramePr>
-        <p:xfrm>
-          <a:off x="4882290" y="4139057"/>
-          <a:ext cx="4178298" cy="1112520"/>
-        </p:xfrm>
-        <a:graphic>
-          <a:graphicData uri="http://schemas.openxmlformats.org/drawingml/2006/table">
-            <a:tbl>
-              <a:tblPr firstRow="1" bandRow="1">
-                <a:tableStyleId>{5C22544A-7EE6-4342-B048-85BDC9FD1C3A}</a:tableStyleId>
-              </a:tblPr>
-              <a:tblGrid>
-                <a:gridCol w="2089149">
-                  <a:extLst>
-                    <a:ext uri="{9D8B030D-6E8A-4147-A177-3AD203B41FA5}">
-                      <a16:colId xmlns:a16="http://schemas.microsoft.com/office/drawing/2014/main" val="1922141735"/>
-                    </a:ext>
-                  </a:extLst>
-                </a:gridCol>
-                <a:gridCol w="2089149">
-                  <a:extLst>
-                    <a:ext uri="{9D8B030D-6E8A-4147-A177-3AD203B41FA5}">
-                      <a16:colId xmlns:a16="http://schemas.microsoft.com/office/drawing/2014/main" val="2956065983"/>
-                    </a:ext>
-                  </a:extLst>
-                </a:gridCol>
-              </a:tblGrid>
-              <a:tr h="370840">
-                <a:tc>
-                  <a:txBody>
-                    <a:bodyPr/>
-                    <a:lstStyle/>
-                    <a:p>
-                      <a:r>
-                        <a:rPr lang="en-US" sz="1400" dirty="0"/>
-                        <a:t>Variable</a:t>
-                      </a:r>
-                      <a:endParaRPr lang="en-GB" sz="1400" dirty="0"/>
-                    </a:p>
-                  </a:txBody>
-                  <a:tcPr/>
-                </a:tc>
-                <a:tc>
-                  <a:txBody>
-                    <a:bodyPr/>
-                    <a:lstStyle/>
-                    <a:p>
-                      <a:r>
-                        <a:rPr lang="en-US" sz="1400" dirty="0"/>
-                        <a:t>Type</a:t>
-                      </a:r>
-                      <a:endParaRPr lang="en-GB" sz="1400" dirty="0"/>
-                    </a:p>
-                  </a:txBody>
-                  <a:tcPr/>
-                </a:tc>
-                <a:extLst>
-                  <a:ext uri="{0D108BD9-81ED-4DB2-BD59-A6C34878D82A}">
-                    <a16:rowId xmlns:a16="http://schemas.microsoft.com/office/drawing/2014/main" val="2821401175"/>
-                  </a:ext>
-                </a:extLst>
-              </a:tr>
-              <a:tr h="370840">
-                <a:tc>
-                  <a:txBody>
-                    <a:bodyPr/>
-                    <a:lstStyle/>
-                    <a:p>
-                      <a:r>
-                        <a:rPr lang="en-US" sz="1200" dirty="0"/>
-                        <a:t>Variable 1</a:t>
-                      </a:r>
-                      <a:endParaRPr lang="en-GB" sz="1200" dirty="0"/>
-                    </a:p>
-                  </a:txBody>
-                  <a:tcPr/>
-                </a:tc>
-                <a:tc>
-                  <a:txBody>
-                    <a:bodyPr/>
-                    <a:lstStyle/>
-                    <a:p>
-                      <a:r>
-                        <a:rPr lang="en-US" sz="1200" dirty="0"/>
-                        <a:t>Numeric</a:t>
-                      </a:r>
-                      <a:endParaRPr lang="en-GB" sz="1200" dirty="0"/>
-                    </a:p>
-                  </a:txBody>
-                  <a:tcPr/>
-                </a:tc>
-                <a:extLst>
-                  <a:ext uri="{0D108BD9-81ED-4DB2-BD59-A6C34878D82A}">
-                    <a16:rowId xmlns:a16="http://schemas.microsoft.com/office/drawing/2014/main" val="3202199352"/>
-                  </a:ext>
-                </a:extLst>
-              </a:tr>
-              <a:tr h="370840">
-                <a:tc>
-                  <a:txBody>
-                    <a:bodyPr/>
-                    <a:lstStyle/>
-                    <a:p>
-                      <a:r>
-                        <a:rPr lang="en-US" sz="1200" dirty="0"/>
-                        <a:t>Variable 2</a:t>
-                      </a:r>
-                      <a:endParaRPr lang="en-GB" sz="1200" dirty="0"/>
-                    </a:p>
-                  </a:txBody>
-                  <a:tcPr/>
-                </a:tc>
-                <a:tc>
-                  <a:txBody>
-                    <a:bodyPr/>
-                    <a:lstStyle/>
-                    <a:p>
-                      <a:r>
-                        <a:rPr lang="en-US" sz="1200" dirty="0"/>
-                        <a:t>Categorical</a:t>
-                      </a:r>
-                      <a:endParaRPr lang="en-GB" sz="1200" dirty="0"/>
-                    </a:p>
-                  </a:txBody>
-                  <a:tcPr/>
-                </a:tc>
-                <a:extLst>
-                  <a:ext uri="{0D108BD9-81ED-4DB2-BD59-A6C34878D82A}">
-                    <a16:rowId xmlns:a16="http://schemas.microsoft.com/office/drawing/2014/main" val="2473242010"/>
-                  </a:ext>
-                </a:extLst>
-              </a:tr>
-            </a:tbl>
-          </a:graphicData>
-        </a:graphic>
-      </p:graphicFrame>
-      <p:sp>
-        <p:nvSpPr>
-          <p:cNvPr id="10" name="Rectangle 9">
-            <a:extLst>
-              <a:ext uri="{FF2B5EF4-FFF2-40B4-BE49-F238E27FC236}">
-                <a16:creationId xmlns:a16="http://schemas.microsoft.com/office/drawing/2014/main" id="{61114EC5-034B-1ADA-C1F8-62FDCCE2A9A4}"/>
-              </a:ext>
-            </a:extLst>
-          </p:cNvPr>
-          <p:cNvSpPr/>
-          <p:nvPr/>
-        </p:nvSpPr>
-        <p:spPr>
-          <a:xfrm>
-            <a:off x="5130744" y="5656129"/>
-            <a:ext cx="1398030" cy="724214"/>
-          </a:xfrm>
-          <a:prstGeom prst="rect">
-            <a:avLst/>
-          </a:prstGeom>
-          <a:ln w="38100"/>
-        </p:spPr>
-        <p:style>
-          <a:lnRef idx="2">
-            <a:schemeClr val="accent1">
-              <a:shade val="50000"/>
-            </a:schemeClr>
-          </a:lnRef>
-          <a:fillRef idx="1">
-            <a:schemeClr val="accent1"/>
-          </a:fillRef>
-          <a:effectRef idx="0">
-            <a:schemeClr val="accent1"/>
-          </a:effectRef>
-          <a:fontRef idx="minor">
-            <a:schemeClr val="lt1"/>
-          </a:fontRef>
-        </p:style>
-        <p:txBody>
-          <a:bodyPr rtlCol="0" anchor="ctr"/>
-          <a:lstStyle/>
-          <a:p>
-            <a:pPr algn="ctr"/>
-            <a:r>
-              <a:rPr lang="en-US" dirty="0"/>
-              <a:t>Before Cleaning</a:t>
-            </a:r>
-            <a:endParaRPr lang="en-GB" dirty="0"/>
-          </a:p>
-        </p:txBody>
-      </p:sp>
-      <p:sp>
-        <p:nvSpPr>
-          <p:cNvPr id="12" name="Rectangle 11">
-            <a:extLst>
-              <a:ext uri="{FF2B5EF4-FFF2-40B4-BE49-F238E27FC236}">
-                <a16:creationId xmlns:a16="http://schemas.microsoft.com/office/drawing/2014/main" id="{6DA0385D-A5DD-C169-AF26-24FFB0DB2E30}"/>
-              </a:ext>
-            </a:extLst>
-          </p:cNvPr>
-          <p:cNvSpPr/>
-          <p:nvPr/>
-        </p:nvSpPr>
-        <p:spPr>
-          <a:xfrm>
-            <a:off x="6841409" y="5656128"/>
-            <a:ext cx="1398030" cy="724214"/>
-          </a:xfrm>
-          <a:prstGeom prst="rect">
-            <a:avLst/>
-          </a:prstGeom>
-          <a:ln w="38100"/>
-        </p:spPr>
-        <p:style>
-          <a:lnRef idx="2">
-            <a:schemeClr val="accent1">
-              <a:shade val="50000"/>
-            </a:schemeClr>
-          </a:lnRef>
-          <a:fillRef idx="1">
-            <a:schemeClr val="accent1"/>
-          </a:fillRef>
-          <a:effectRef idx="0">
-            <a:schemeClr val="accent1"/>
-          </a:effectRef>
-          <a:fontRef idx="minor">
-            <a:schemeClr val="lt1"/>
-          </a:fontRef>
-        </p:style>
-        <p:txBody>
-          <a:bodyPr rtlCol="0" anchor="ctr"/>
-          <a:lstStyle/>
-          <a:p>
-            <a:pPr algn="ctr"/>
-            <a:r>
-              <a:rPr lang="en-US" dirty="0"/>
-              <a:t>After Cleaning</a:t>
-            </a:r>
-            <a:endParaRPr lang="en-GB" dirty="0"/>
-          </a:p>
-        </p:txBody>
-      </p:sp>
-      <p:sp>
-        <p:nvSpPr>
-          <p:cNvPr id="13" name="TextBox 12">
-            <a:extLst>
-              <a:ext uri="{FF2B5EF4-FFF2-40B4-BE49-F238E27FC236}">
-                <a16:creationId xmlns:a16="http://schemas.microsoft.com/office/drawing/2014/main" id="{CA1EAAA5-A1A2-3B0D-12F1-60B2E50A677D}"/>
-              </a:ext>
-            </a:extLst>
-          </p:cNvPr>
-          <p:cNvSpPr txBox="1"/>
-          <p:nvPr/>
-        </p:nvSpPr>
-        <p:spPr>
-          <a:xfrm>
-            <a:off x="1291458" y="7603951"/>
-            <a:ext cx="2320660" cy="830997"/>
-          </a:xfrm>
-          <a:prstGeom prst="rect">
-            <a:avLst/>
-          </a:prstGeom>
-          <a:noFill/>
-          <a:ln w="38100">
-            <a:noFill/>
-          </a:ln>
-        </p:spPr>
-        <p:txBody>
-          <a:bodyPr wrap="square" rtlCol="0">
-            <a:spAutoFit/>
-          </a:bodyPr>
-          <a:lstStyle/>
-          <a:p>
-            <a:r>
-              <a:rPr lang="en-US" sz="1200" dirty="0">
-                <a:solidFill>
-                  <a:prstClr val="black"/>
-                </a:solidFill>
-                <a:latin typeface="Calibri" panose="020F0502020204030204"/>
-              </a:rPr>
-              <a:t>Explain here how you chose the hyper parameter settings to explore and how you ran your experiments.</a:t>
-            </a:r>
-            <a:endParaRPr lang="en-GB" sz="1200" dirty="0">
-              <a:solidFill>
-                <a:prstClr val="black"/>
-              </a:solidFill>
-              <a:latin typeface="Calibri" panose="020F0502020204030204"/>
-            </a:endParaRPr>
-          </a:p>
-        </p:txBody>
-      </p:sp>
-      <p:sp>
-        <p:nvSpPr>
-          <p:cNvPr id="9" name="TextBox 8">
-            <a:extLst>
-              <a:ext uri="{FF2B5EF4-FFF2-40B4-BE49-F238E27FC236}">
-                <a16:creationId xmlns:a16="http://schemas.microsoft.com/office/drawing/2014/main" id="{F206284C-0E38-E129-A921-7FCAD4177EEC}"/>
-              </a:ext>
-            </a:extLst>
-          </p:cNvPr>
-          <p:cNvSpPr txBox="1"/>
-          <p:nvPr/>
-        </p:nvSpPr>
-        <p:spPr>
-          <a:xfrm>
-            <a:off x="540612" y="2448689"/>
-            <a:ext cx="3830021" cy="2870016"/>
-          </a:xfrm>
-          <a:prstGeom prst="rect">
-            <a:avLst/>
-          </a:prstGeom>
-          <a:noFill/>
-          <a:ln w="38100">
-            <a:solidFill>
-              <a:schemeClr val="accent1">
-                <a:lumMod val="60000"/>
-                <a:lumOff val="40000"/>
-              </a:schemeClr>
-            </a:solidFill>
-          </a:ln>
-        </p:spPr>
-        <p:txBody>
-          <a:bodyPr wrap="square" lIns="91440" tIns="45720" rIns="91440" bIns="45720" anchor="t">
-            <a:spAutoFit/>
-          </a:bodyPr>
-          <a:lstStyle/>
-          <a:p>
-            <a:r>
-              <a:rPr lang="en-GB" sz="2000" dirty="0"/>
-              <a:t>2. Project Methodology</a:t>
-            </a:r>
-          </a:p>
-          <a:p>
-            <a:pPr marL="228600" indent="-228600">
-              <a:buAutoNum type="arabicPeriod"/>
-            </a:pPr>
-            <a:r>
-              <a:rPr lang="en-GB" sz="1050" dirty="0"/>
-              <a:t>List the steps you took to carry out the project</a:t>
-            </a:r>
-            <a:endParaRPr lang="en-GB" sz="1050" dirty="0">
-              <a:ea typeface="Calibri"/>
-              <a:cs typeface="Calibri"/>
-            </a:endParaRPr>
-          </a:p>
-          <a:p>
-            <a:pPr marL="228600" indent="-228600">
-              <a:buAutoNum type="arabicPeriod"/>
-            </a:pPr>
-            <a:r>
-              <a:rPr lang="en-GB" sz="1050" dirty="0"/>
-              <a:t>Include train/validate/test split and model selection</a:t>
-            </a:r>
-            <a:endParaRPr lang="en-GB" sz="1050" dirty="0">
-              <a:ea typeface="Calibri"/>
-              <a:cs typeface="Calibri"/>
-            </a:endParaRPr>
-          </a:p>
-          <a:p>
-            <a:pPr marL="228600" indent="-228600">
-              <a:buAutoNum type="arabicPeriod"/>
-            </a:pPr>
-            <a:r>
-              <a:rPr lang="en-GB" sz="1050" dirty="0"/>
-              <a:t>This list should cover ALL the steps in the process</a:t>
-            </a:r>
-            <a:endParaRPr lang="en-GB" sz="1050" dirty="0">
-              <a:ea typeface="Calibri"/>
-              <a:cs typeface="Calibri"/>
-            </a:endParaRPr>
-          </a:p>
-          <a:p>
-            <a:pPr marL="228600" indent="-228600">
-              <a:buAutoNum type="arabicPeriod"/>
-            </a:pPr>
-            <a:r>
-              <a:rPr lang="en-GB" sz="1050" dirty="0"/>
-              <a:t>…</a:t>
-            </a:r>
-            <a:endParaRPr lang="en-GB" sz="1050" dirty="0">
-              <a:ea typeface="Calibri"/>
-              <a:cs typeface="Calibri"/>
-            </a:endParaRPr>
-          </a:p>
-          <a:p>
-            <a:pPr marL="228600" indent="-228600">
-              <a:buAutoNum type="arabicPeriod"/>
-            </a:pPr>
-            <a:r>
-              <a:rPr lang="en-GB" sz="1050" dirty="0"/>
-              <a:t>…</a:t>
-            </a:r>
-            <a:endParaRPr lang="en-GB" sz="1050" dirty="0">
-              <a:ea typeface="Calibri"/>
-              <a:cs typeface="Calibri"/>
-            </a:endParaRPr>
-          </a:p>
-          <a:p>
-            <a:endParaRPr lang="en-GB" sz="1200" dirty="0"/>
-          </a:p>
-          <a:p>
-            <a:endParaRPr lang="en-GB" sz="1200" dirty="0"/>
-          </a:p>
-          <a:p>
-            <a:endParaRPr lang="en-GB" sz="1200" dirty="0"/>
-          </a:p>
-          <a:p>
-            <a:endParaRPr lang="en-GB" sz="1200" dirty="0"/>
-          </a:p>
-          <a:p>
-            <a:endParaRPr lang="en-GB" sz="1200" dirty="0"/>
-          </a:p>
-          <a:p>
-            <a:endParaRPr lang="en-GB" sz="1200" dirty="0"/>
-          </a:p>
-          <a:p>
-            <a:endParaRPr lang="en-GB" sz="1200" dirty="0"/>
-          </a:p>
-          <a:p>
-            <a:endParaRPr lang="en-GB" sz="1200" dirty="0"/>
-          </a:p>
-          <a:p>
-            <a:endParaRPr lang="en-GB" sz="1200" dirty="0"/>
-          </a:p>
-        </p:txBody>
-      </p:sp>
-      <p:sp>
-        <p:nvSpPr>
-          <p:cNvPr id="14" name="TextBox 13">
-            <a:extLst>
-              <a:ext uri="{FF2B5EF4-FFF2-40B4-BE49-F238E27FC236}">
-                <a16:creationId xmlns:a16="http://schemas.microsoft.com/office/drawing/2014/main" id="{720648D2-2C2F-D4B7-A939-01723E5AA434}"/>
-              </a:ext>
-            </a:extLst>
-          </p:cNvPr>
-          <p:cNvSpPr txBox="1"/>
-          <p:nvPr/>
-        </p:nvSpPr>
-        <p:spPr>
-          <a:xfrm>
-            <a:off x="4569655" y="2448689"/>
-            <a:ext cx="4803568" cy="2769989"/>
-          </a:xfrm>
-          <a:prstGeom prst="rect">
-            <a:avLst/>
-          </a:prstGeom>
-          <a:noFill/>
-          <a:ln w="38100">
-            <a:solidFill>
-              <a:schemeClr val="accent1">
-                <a:lumMod val="60000"/>
-                <a:lumOff val="40000"/>
-              </a:schemeClr>
-            </a:solidFill>
-          </a:ln>
-        </p:spPr>
-        <p:txBody>
-          <a:bodyPr wrap="square" lIns="91440" tIns="45720" rIns="91440" bIns="45720" anchor="t">
-            <a:spAutoFit/>
-          </a:bodyPr>
-          <a:lstStyle/>
-          <a:p>
-            <a:pPr lvl="0" defTabSz="1706910">
-              <a:defRPr/>
-            </a:pPr>
-            <a:r>
-              <a:rPr lang="en-GB" sz="2000" dirty="0"/>
-              <a:t>3 Variables/ Data Understanding </a:t>
-            </a:r>
-            <a:endParaRPr lang="en-GB" sz="1000" dirty="0">
-              <a:ea typeface="Calibri"/>
-              <a:cs typeface="Calibri"/>
-            </a:endParaRPr>
-          </a:p>
-          <a:p>
-            <a:pPr marL="0" marR="0" lvl="0" indent="0" algn="l" defTabSz="1706910" rtl="0" eaLnBrk="1" fontAlgn="auto" latinLnBrk="0" hangingPunct="1">
-              <a:lnSpc>
-                <a:spcPct val="100000"/>
-              </a:lnSpc>
-              <a:spcBef>
-                <a:spcPts val="0"/>
-              </a:spcBef>
-              <a:spcAft>
-                <a:spcPts val="0"/>
-              </a:spcAft>
-              <a:buClrTx/>
-              <a:buSzTx/>
-              <a:buFontTx/>
-              <a:buNone/>
-              <a:tabLst/>
-              <a:defRPr/>
-            </a:pPr>
-            <a:r>
-              <a:rPr lang="en-GB" sz="1000" dirty="0">
-                <a:solidFill>
-                  <a:prstClr val="black"/>
-                </a:solidFill>
-                <a:latin typeface="Calibri" panose="020F0502020204030204"/>
-              </a:rPr>
-              <a:t>Say which variables you used in your model, and whether you treated then as numeric3 Variables</a:t>
-            </a:r>
-            <a:endParaRPr lang="en-GB" sz="1000" dirty="0">
-              <a:solidFill>
-                <a:prstClr val="black"/>
-              </a:solidFill>
-              <a:latin typeface="Calibri" panose="020F0502020204030204"/>
-              <a:ea typeface="Calibri"/>
-              <a:cs typeface="Calibri"/>
-            </a:endParaRPr>
-          </a:p>
-          <a:p>
-            <a:pPr marL="0" marR="0" lvl="0" indent="0" algn="l" defTabSz="1706910" rtl="0" eaLnBrk="1" fontAlgn="auto" latinLnBrk="0" hangingPunct="1">
-              <a:lnSpc>
-                <a:spcPct val="100000"/>
-              </a:lnSpc>
-              <a:spcBef>
-                <a:spcPts val="0"/>
-              </a:spcBef>
-              <a:spcAft>
-                <a:spcPts val="0"/>
-              </a:spcAft>
-              <a:buClrTx/>
-              <a:buSzTx/>
-              <a:buFontTx/>
-              <a:buNone/>
-              <a:tabLst/>
-              <a:defRPr/>
-            </a:pPr>
-            <a:r>
-              <a:rPr lang="en-GB" sz="1000" dirty="0">
-                <a:solidFill>
-                  <a:prstClr val="black"/>
-                </a:solidFill>
-                <a:latin typeface="Calibri" panose="020F0502020204030204"/>
-              </a:rPr>
-              <a:t>Say which variables you used in your model, and whether you treated then as numeric or categorical. Explain the impact your choices will have on the models you build. You can use a table:</a:t>
-            </a:r>
-            <a:endParaRPr lang="en-GB" sz="1000" dirty="0">
-              <a:solidFill>
-                <a:prstClr val="black"/>
-              </a:solidFill>
-              <a:latin typeface="Calibri" panose="020F0502020204030204"/>
-              <a:ea typeface="Calibri"/>
-              <a:cs typeface="Calibri"/>
-            </a:endParaRPr>
-          </a:p>
-          <a:p>
-            <a:r>
-              <a:rPr lang="en-GB" sz="1000" dirty="0">
-                <a:solidFill>
-                  <a:prstClr val="black"/>
-                </a:solidFill>
-                <a:latin typeface="Calibri" panose="020F0502020204030204"/>
-              </a:rPr>
-              <a:t> or categorical. Explain the impact your choices will have on the models you build. You can use a table:</a:t>
-            </a:r>
-            <a:endParaRPr lang="en-GB" sz="1000" dirty="0">
-              <a:solidFill>
-                <a:prstClr val="black"/>
-              </a:solidFill>
-              <a:latin typeface="Calibri" panose="020F0502020204030204"/>
-              <a:ea typeface="Calibri"/>
-              <a:cs typeface="Calibri"/>
-            </a:endParaRPr>
-          </a:p>
-          <a:p>
-            <a:endParaRPr lang="en-GB" sz="1200" dirty="0">
-              <a:solidFill>
-                <a:prstClr val="black"/>
-              </a:solidFill>
-              <a:latin typeface="Calibri" panose="020F0502020204030204"/>
-            </a:endParaRPr>
-          </a:p>
-          <a:p>
-            <a:endParaRPr lang="en-GB" sz="1200" dirty="0">
-              <a:solidFill>
-                <a:prstClr val="black"/>
-              </a:solidFill>
-              <a:latin typeface="Calibri" panose="020F0502020204030204"/>
-            </a:endParaRPr>
-          </a:p>
-          <a:p>
-            <a:endParaRPr lang="en-GB" sz="1200" dirty="0">
-              <a:solidFill>
-                <a:prstClr val="black"/>
-              </a:solidFill>
-              <a:latin typeface="Calibri" panose="020F0502020204030204"/>
-            </a:endParaRPr>
-          </a:p>
-          <a:p>
-            <a:endParaRPr lang="en-GB" sz="1200" dirty="0">
-              <a:solidFill>
-                <a:prstClr val="black"/>
-              </a:solidFill>
-              <a:latin typeface="Calibri" panose="020F0502020204030204"/>
-            </a:endParaRPr>
-          </a:p>
-          <a:p>
-            <a:endParaRPr lang="en-GB" sz="1200" dirty="0">
-              <a:solidFill>
-                <a:prstClr val="black"/>
-              </a:solidFill>
-              <a:latin typeface="Calibri" panose="020F0502020204030204"/>
-            </a:endParaRPr>
-          </a:p>
-          <a:p>
-            <a:endParaRPr lang="en-GB" sz="1200" dirty="0">
-              <a:solidFill>
-                <a:prstClr val="black"/>
-              </a:solidFill>
-              <a:latin typeface="Calibri" panose="020F0502020204030204"/>
-            </a:endParaRPr>
-          </a:p>
-          <a:p>
-            <a:endParaRPr lang="en-GB" sz="1200" dirty="0">
-              <a:solidFill>
-                <a:prstClr val="black"/>
-              </a:solidFill>
-              <a:latin typeface="Calibri" panose="020F0502020204030204"/>
-            </a:endParaRPr>
-          </a:p>
-        </p:txBody>
-      </p:sp>
-      <p:sp>
-        <p:nvSpPr>
-          <p:cNvPr id="16" name="TextBox 15">
-            <a:extLst>
-              <a:ext uri="{FF2B5EF4-FFF2-40B4-BE49-F238E27FC236}">
-                <a16:creationId xmlns:a16="http://schemas.microsoft.com/office/drawing/2014/main" id="{303339E9-D30D-6514-92CD-6CDE78311274}"/>
-              </a:ext>
-            </a:extLst>
-          </p:cNvPr>
-          <p:cNvSpPr txBox="1"/>
-          <p:nvPr/>
-        </p:nvSpPr>
-        <p:spPr>
-          <a:xfrm>
-            <a:off x="525101" y="5538821"/>
-            <a:ext cx="8848121" cy="1046440"/>
-          </a:xfrm>
-          <a:prstGeom prst="rect">
-            <a:avLst/>
-          </a:prstGeom>
-          <a:noFill/>
-          <a:ln w="38100">
-            <a:solidFill>
-              <a:schemeClr val="accent1">
-                <a:lumMod val="60000"/>
-                <a:lumOff val="40000"/>
-              </a:schemeClr>
-            </a:solidFill>
-          </a:ln>
-        </p:spPr>
-        <p:txBody>
-          <a:bodyPr wrap="square" lIns="91440" tIns="45720" rIns="91440" bIns="45720" anchor="t">
-            <a:spAutoFit/>
-          </a:bodyPr>
-          <a:lstStyle/>
-          <a:p>
-            <a:pPr marL="0" marR="0" lvl="0" indent="0" algn="l" defTabSz="1706910" rtl="0" eaLnBrk="1" fontAlgn="auto" latinLnBrk="0" hangingPunct="1">
-              <a:lnSpc>
-                <a:spcPct val="100000"/>
-              </a:lnSpc>
-              <a:spcBef>
-                <a:spcPts val="0"/>
-              </a:spcBef>
-              <a:spcAft>
-                <a:spcPts val="0"/>
-              </a:spcAft>
-              <a:buClrTx/>
-              <a:buSzTx/>
-              <a:buFontTx/>
-              <a:buNone/>
-              <a:tabLst/>
-              <a:defRPr/>
-            </a:pPr>
-            <a:r>
-              <a:rPr kumimoji="0" lang="en-GB" sz="2000" b="0" i="0" u="none" strike="noStrike" kern="1200" cap="none" spc="0" normalizeH="0" baseline="0" noProof="0" dirty="0">
-                <a:ln>
-                  <a:noFill/>
-                </a:ln>
-                <a:solidFill>
-                  <a:prstClr val="black"/>
-                </a:solidFill>
-                <a:effectLst/>
-                <a:uLnTx/>
-                <a:uFillTx/>
-                <a:latin typeface="Calibri" panose="020F0502020204030204"/>
-                <a:ea typeface="+mn-ea"/>
-                <a:cs typeface="+mn-cs"/>
-              </a:rPr>
-              <a:t>4. Data Preparation</a:t>
-            </a:r>
-          </a:p>
-          <a:p>
-            <a:pPr marL="0" marR="0" lvl="0" indent="0" algn="l" defTabSz="1706910" rtl="0" eaLnBrk="1" fontAlgn="auto" latinLnBrk="0" hangingPunct="1">
-              <a:lnSpc>
-                <a:spcPct val="100000"/>
-              </a:lnSpc>
-              <a:spcBef>
-                <a:spcPts val="0"/>
-              </a:spcBef>
-              <a:spcAft>
-                <a:spcPts val="0"/>
-              </a:spcAft>
-              <a:buClrTx/>
-              <a:buSzTx/>
-              <a:buFontTx/>
-              <a:buNone/>
-              <a:tabLst/>
-              <a:defRPr/>
-            </a:pPr>
-            <a:r>
-              <a:rPr kumimoji="0" lang="en-GB" sz="1050" b="0" i="0" u="none" strike="noStrike" kern="1200" cap="none" spc="0" normalizeH="0" baseline="0" noProof="0" dirty="0">
-                <a:ln>
-                  <a:noFill/>
-                </a:ln>
-                <a:solidFill>
-                  <a:prstClr val="black"/>
-                </a:solidFill>
-                <a:effectLst/>
-                <a:uLnTx/>
-                <a:uFillTx/>
-                <a:latin typeface="Calibri" panose="020F0502020204030204"/>
-                <a:ea typeface="+mn-ea"/>
-                <a:cs typeface="+mn-cs"/>
-              </a:rPr>
-              <a:t>Show two histograms here. One should show the distribution of one</a:t>
-            </a:r>
-            <a:endParaRPr lang="en-GB" sz="1050" b="0" i="0" u="none" strike="noStrike" kern="1200" cap="none" spc="0" normalizeH="0" baseline="0" noProof="0" dirty="0">
-              <a:ln>
-                <a:noFill/>
-              </a:ln>
-              <a:solidFill>
-                <a:prstClr val="black"/>
-              </a:solidFill>
-              <a:effectLst/>
-              <a:uLnTx/>
-              <a:uFillTx/>
-              <a:latin typeface="Calibri" panose="020F0502020204030204"/>
-              <a:ea typeface="Calibri"/>
-              <a:cs typeface="Calibri"/>
-            </a:endParaRPr>
-          </a:p>
-          <a:p>
-            <a:pPr marL="0" marR="0" lvl="0" indent="0" algn="l" defTabSz="1706910" rtl="0" eaLnBrk="1" fontAlgn="auto" latinLnBrk="0" hangingPunct="1">
-              <a:lnSpc>
-                <a:spcPct val="100000"/>
-              </a:lnSpc>
-              <a:spcBef>
-                <a:spcPts val="0"/>
-              </a:spcBef>
-              <a:spcAft>
-                <a:spcPts val="0"/>
-              </a:spcAft>
-              <a:buClrTx/>
-              <a:buSzTx/>
-              <a:buFontTx/>
-              <a:buNone/>
-              <a:tabLst/>
-              <a:defRPr/>
-            </a:pPr>
-            <a:r>
-              <a:rPr kumimoji="0" lang="en-GB" sz="1050" b="0" i="0" u="none" strike="noStrike" kern="1200" cap="none" spc="0" normalizeH="0" baseline="0" noProof="0" dirty="0">
-                <a:ln>
-                  <a:noFill/>
-                </a:ln>
-                <a:solidFill>
-                  <a:prstClr val="black"/>
-                </a:solidFill>
-                <a:effectLst/>
-                <a:uLnTx/>
-                <a:uFillTx/>
-                <a:latin typeface="Calibri" panose="020F0502020204030204"/>
-                <a:ea typeface="+mn-ea"/>
-                <a:cs typeface="+mn-cs"/>
-              </a:rPr>
-              <a:t>variable before it has been cleaned. The other should show the</a:t>
-            </a:r>
-            <a:endParaRPr lang="en-GB" sz="1050" b="0" i="0" u="none" strike="noStrike" kern="1200" cap="none" spc="0" normalizeH="0" baseline="0" noProof="0" dirty="0">
-              <a:ln>
-                <a:noFill/>
-              </a:ln>
-              <a:solidFill>
-                <a:prstClr val="black"/>
-              </a:solidFill>
-              <a:effectLst/>
-              <a:uLnTx/>
-              <a:uFillTx/>
-              <a:latin typeface="Calibri" panose="020F0502020204030204"/>
-              <a:ea typeface="Calibri"/>
-              <a:cs typeface="Calibri"/>
-            </a:endParaRPr>
-          </a:p>
-          <a:p>
-            <a:pPr marL="0" marR="0" lvl="0" indent="0" algn="l" defTabSz="1706910" rtl="0" eaLnBrk="1" fontAlgn="auto" latinLnBrk="0" hangingPunct="1">
-              <a:lnSpc>
-                <a:spcPct val="100000"/>
-              </a:lnSpc>
-              <a:spcBef>
-                <a:spcPts val="0"/>
-              </a:spcBef>
-              <a:spcAft>
-                <a:spcPts val="0"/>
-              </a:spcAft>
-              <a:buClrTx/>
-              <a:buSzTx/>
-              <a:buFontTx/>
-              <a:buNone/>
-              <a:tabLst/>
-              <a:defRPr/>
-            </a:pPr>
-            <a:r>
-              <a:rPr kumimoji="0" lang="en-GB" sz="1050" b="0" i="0" u="none" strike="noStrike" kern="1200" cap="none" spc="0" normalizeH="0" baseline="0" noProof="0" dirty="0">
-                <a:ln>
-                  <a:noFill/>
-                </a:ln>
-                <a:solidFill>
-                  <a:prstClr val="black"/>
-                </a:solidFill>
-                <a:effectLst/>
-                <a:uLnTx/>
-                <a:uFillTx/>
-                <a:latin typeface="Calibri" panose="020F0502020204030204"/>
-                <a:ea typeface="+mn-ea"/>
-                <a:cs typeface="+mn-cs"/>
-              </a:rPr>
-              <a:t>distribution of the same variable after cleaning. Choose a variable</a:t>
-            </a:r>
-            <a:endParaRPr lang="en-GB" sz="1050" b="0" i="0" u="none" strike="noStrike" kern="1200" cap="none" spc="0" normalizeH="0" baseline="0" noProof="0" dirty="0">
-              <a:ln>
-                <a:noFill/>
-              </a:ln>
-              <a:solidFill>
-                <a:prstClr val="black"/>
-              </a:solidFill>
-              <a:effectLst/>
-              <a:uLnTx/>
-              <a:uFillTx/>
-              <a:latin typeface="Calibri" panose="020F0502020204030204"/>
-              <a:ea typeface="Calibri"/>
-              <a:cs typeface="Calibri"/>
-            </a:endParaRPr>
-          </a:p>
-          <a:p>
-            <a:pPr marL="0" marR="0" lvl="0" indent="0" algn="l" defTabSz="1706910" rtl="0" eaLnBrk="1" fontAlgn="auto" latinLnBrk="0" hangingPunct="1">
-              <a:lnSpc>
-                <a:spcPct val="100000"/>
-              </a:lnSpc>
-              <a:spcBef>
-                <a:spcPts val="0"/>
-              </a:spcBef>
-              <a:spcAft>
-                <a:spcPts val="0"/>
-              </a:spcAft>
-              <a:buClrTx/>
-              <a:buSzTx/>
-              <a:buFontTx/>
-              <a:buNone/>
-              <a:tabLst/>
-              <a:defRPr/>
-            </a:pPr>
-            <a:r>
-              <a:rPr kumimoji="0" lang="en-GB" sz="1050" b="0" i="0" u="none" strike="noStrike" kern="1200" cap="none" spc="0" normalizeH="0" baseline="0" noProof="0" dirty="0">
-                <a:ln>
-                  <a:noFill/>
-                </a:ln>
-                <a:solidFill>
-                  <a:prstClr val="black"/>
-                </a:solidFill>
-                <a:effectLst/>
-                <a:uLnTx/>
-                <a:uFillTx/>
-                <a:latin typeface="Calibri" panose="020F0502020204030204"/>
-                <a:ea typeface="+mn-ea"/>
-                <a:cs typeface="+mn-cs"/>
-              </a:rPr>
-              <a:t>that needs to be cleaned!!</a:t>
-            </a:r>
-            <a:endParaRPr lang="en-GB" sz="1050" b="0" i="0" u="none" strike="noStrike" kern="1200" cap="none" spc="0" normalizeH="0" baseline="0" noProof="0" dirty="0">
-              <a:ln>
-                <a:noFill/>
-              </a:ln>
-              <a:solidFill>
-                <a:prstClr val="black"/>
-              </a:solidFill>
-              <a:effectLst/>
-              <a:uLnTx/>
-              <a:uFillTx/>
-              <a:latin typeface="Calibri" panose="020F0502020204030204"/>
-              <a:ea typeface="Calibri"/>
-              <a:cs typeface="Calibri"/>
-            </a:endParaRPr>
-          </a:p>
-        </p:txBody>
-      </p:sp>
-      <p:sp>
-        <p:nvSpPr>
-          <p:cNvPr id="22" name="TextBox 21">
-            <a:extLst>
-              <a:ext uri="{FF2B5EF4-FFF2-40B4-BE49-F238E27FC236}">
-                <a16:creationId xmlns:a16="http://schemas.microsoft.com/office/drawing/2014/main" id="{A963A857-22CD-BC85-9293-B211890D5A3A}"/>
-              </a:ext>
-            </a:extLst>
-          </p:cNvPr>
-          <p:cNvSpPr txBox="1"/>
-          <p:nvPr/>
-        </p:nvSpPr>
-        <p:spPr>
-          <a:xfrm>
-            <a:off x="4914384" y="9812406"/>
-            <a:ext cx="4178298" cy="253916"/>
-          </a:xfrm>
-          <a:prstGeom prst="rect">
-            <a:avLst/>
-          </a:prstGeom>
-          <a:noFill/>
-        </p:spPr>
-        <p:txBody>
-          <a:bodyPr wrap="square" lIns="91440" tIns="45720" rIns="91440" bIns="45720" anchor="t">
-            <a:spAutoFit/>
-          </a:bodyPr>
-          <a:lstStyle/>
-          <a:p>
-            <a:pPr marL="0" marR="0" lvl="0" indent="0" algn="l" defTabSz="1706910" rtl="0" eaLnBrk="1" fontAlgn="auto" latinLnBrk="0" hangingPunct="1">
-              <a:lnSpc>
-                <a:spcPct val="100000"/>
-              </a:lnSpc>
-              <a:spcBef>
-                <a:spcPts val="0"/>
-              </a:spcBef>
-              <a:spcAft>
-                <a:spcPts val="0"/>
-              </a:spcAft>
-              <a:buClrTx/>
-              <a:buSzTx/>
-              <a:buFontTx/>
-              <a:buNone/>
-              <a:tabLst/>
-              <a:defRPr/>
-            </a:pPr>
-            <a:r>
-              <a:rPr kumimoji="0" lang="en-GB" sz="1050" b="0" i="0" u="none" strike="noStrike" kern="1200" cap="none" spc="0" normalizeH="0" baseline="0" noProof="0" dirty="0">
-                <a:ln>
-                  <a:noFill/>
-                </a:ln>
-                <a:solidFill>
-                  <a:prstClr val="black"/>
-                </a:solidFill>
-                <a:effectLst/>
-                <a:uLnTx/>
-                <a:uFillTx/>
-                <a:latin typeface="Calibri" panose="020F0502020204030204"/>
-                <a:ea typeface="+mn-ea"/>
-                <a:cs typeface="+mn-cs"/>
-              </a:rPr>
-              <a:t>Explain what the confusion matrix tells us.</a:t>
-            </a:r>
-          </a:p>
-        </p:txBody>
-      </p:sp>
-      <p:sp>
-        <p:nvSpPr>
-          <p:cNvPr id="3" name="TextBox 2">
-            <a:extLst>
-              <a:ext uri="{FF2B5EF4-FFF2-40B4-BE49-F238E27FC236}">
-                <a16:creationId xmlns:a16="http://schemas.microsoft.com/office/drawing/2014/main" id="{483CDE9C-72DC-E883-E910-51206EB5A594}"/>
-              </a:ext>
-            </a:extLst>
-          </p:cNvPr>
-          <p:cNvSpPr txBox="1"/>
-          <p:nvPr/>
-        </p:nvSpPr>
-        <p:spPr>
-          <a:xfrm>
-            <a:off x="524029" y="10977048"/>
-            <a:ext cx="8847947" cy="923330"/>
-          </a:xfrm>
-          <a:prstGeom prst="rect">
-            <a:avLst/>
-          </a:prstGeom>
-          <a:noFill/>
-          <a:ln w="38100">
-            <a:solidFill>
-              <a:schemeClr val="accent1">
-                <a:lumMod val="60000"/>
-                <a:lumOff val="40000"/>
-              </a:schemeClr>
-            </a:solidFill>
-          </a:ln>
-        </p:spPr>
-        <p:txBody>
-          <a:bodyPr wrap="square" lIns="91440" tIns="45720" rIns="91440" bIns="45720" rtlCol="0" anchor="t">
-            <a:spAutoFit/>
-          </a:bodyPr>
-          <a:lstStyle/>
-          <a:p>
-            <a:r>
-              <a:rPr lang="en-GB" sz="2000" dirty="0"/>
-              <a:t>7. Insight about data </a:t>
-            </a:r>
-            <a:r>
-              <a:rPr lang="en-GB" sz="2000" b="0" i="0" dirty="0">
-                <a:solidFill>
-                  <a:srgbClr val="000000"/>
-                </a:solidFill>
-                <a:effectLst/>
-                <a:latin typeface="Calibri"/>
-                <a:ea typeface="Calibri"/>
-                <a:cs typeface="Calibri"/>
-              </a:rPr>
-              <a:t>or </a:t>
-            </a:r>
-            <a:r>
-              <a:rPr lang="en-GB" sz="2000" dirty="0">
-                <a:solidFill>
-                  <a:srgbClr val="000000"/>
-                </a:solidFill>
-                <a:latin typeface="Calibri"/>
-                <a:ea typeface="Calibri"/>
-                <a:cs typeface="Calibri"/>
-              </a:rPr>
-              <a:t>models gained</a:t>
-            </a:r>
-          </a:p>
-          <a:p>
-            <a:endParaRPr lang="en-GB" sz="1200" dirty="0">
-              <a:solidFill>
-                <a:srgbClr val="000000"/>
-              </a:solidFill>
-              <a:latin typeface="Calibri"/>
-              <a:ea typeface="Calibri"/>
-              <a:cs typeface="Calibri"/>
-            </a:endParaRPr>
-          </a:p>
-          <a:p>
-            <a:pPr marL="457200" indent="-457200">
-              <a:buFont typeface="Arial,Sans-Serif"/>
-              <a:buChar char="•"/>
-            </a:pPr>
-            <a:r>
-              <a:rPr lang="en-GB" sz="1100" dirty="0">
-                <a:solidFill>
-                  <a:srgbClr val="000000"/>
-                </a:solidFill>
-                <a:latin typeface="Calibri"/>
-                <a:ea typeface="Calibri"/>
-                <a:cs typeface="Calibri"/>
-              </a:rPr>
-              <a:t>For example</a:t>
-            </a:r>
-            <a:r>
-              <a:rPr lang="en-GB" sz="1100" b="0" i="0" dirty="0">
-                <a:solidFill>
-                  <a:srgbClr val="000000"/>
-                </a:solidFill>
-                <a:effectLst/>
-                <a:latin typeface="Calibri"/>
-                <a:ea typeface="Calibri"/>
-                <a:cs typeface="Calibri"/>
-              </a:rPr>
-              <a:t>, </a:t>
-            </a:r>
-            <a:r>
-              <a:rPr lang="en-GB" sz="1100" dirty="0">
-                <a:solidFill>
-                  <a:srgbClr val="000000"/>
-                </a:solidFill>
-                <a:latin typeface="Calibri"/>
-                <a:ea typeface="Calibri"/>
-                <a:cs typeface="Calibri"/>
-              </a:rPr>
-              <a:t>did you learn anything about specific features that drive the model? Is the model biased towards particular groups in the data? Is the model you've chosen good for helping us to understand why particular predictions are made?</a:t>
-            </a:r>
-            <a:endParaRPr lang="en-US" sz="1100" dirty="0">
-              <a:solidFill>
-                <a:srgbClr val="000000"/>
-              </a:solidFill>
-              <a:latin typeface="Calibri"/>
-              <a:ea typeface="Calibri"/>
-              <a:cs typeface="Calibri"/>
-            </a:endParaRPr>
-          </a:p>
-        </p:txBody>
-      </p:sp>
-    </p:spTree>
-    <p:extLst>
-      <p:ext uri="{BB962C8B-B14F-4D97-AF65-F5344CB8AC3E}">
-        <p14:creationId xmlns:p14="http://schemas.microsoft.com/office/powerpoint/2010/main" val="16987582"/>
       </p:ext>
     </p:extLst>
   </p:cSld>
@@ -9493,12 +6899,9 @@
 </file>
 
 <file path=customXml/item1.xml><?xml version="1.0" encoding="utf-8"?>
-<?mso-contentType ?>
-<FormTemplates xmlns="http://schemas.microsoft.com/sharepoint/v3/contenttype/forms">
-  <Display>DocumentLibraryForm</Display>
-  <Edit>DocumentLibraryForm</Edit>
-  <New>DocumentLibraryForm</New>
-</FormTemplates>
+<p:properties xmlns:p="http://schemas.microsoft.com/office/2006/metadata/properties" xmlns:xsi="http://www.w3.org/2001/XMLSchema-instance" xmlns:pc="http://schemas.microsoft.com/office/infopath/2007/PartnerControls">
+  <documentManagement/>
+</p:properties>
 </file>
 
 <file path=customXml/item2.xml><?xml version="1.0" encoding="utf-8"?>
@@ -9646,15 +7049,19 @@
 </file>
 
 <file path=customXml/item3.xml><?xml version="1.0" encoding="utf-8"?>
-<p:properties xmlns:p="http://schemas.microsoft.com/office/2006/metadata/properties" xmlns:xsi="http://www.w3.org/2001/XMLSchema-instance" xmlns:pc="http://schemas.microsoft.com/office/infopath/2007/PartnerControls">
-  <documentManagement/>
-</p:properties>
+<?mso-contentType ?>
+<FormTemplates xmlns="http://schemas.microsoft.com/sharepoint/v3/contenttype/forms">
+  <Display>DocumentLibraryForm</Display>
+  <Edit>DocumentLibraryForm</Edit>
+  <New>DocumentLibraryForm</New>
+</FormTemplates>
 </file>
 
 <file path=customXml/itemProps1.xml><?xml version="1.0" encoding="utf-8"?>
-<ds:datastoreItem xmlns:ds="http://schemas.openxmlformats.org/officeDocument/2006/customXml" ds:itemID="{B778572B-7D4E-4A33-82E0-6D91E9A8F67C}">
+<ds:datastoreItem xmlns:ds="http://schemas.openxmlformats.org/officeDocument/2006/customXml" ds:itemID="{2149E239-D122-40A9-AB11-D677033190C0}">
   <ds:schemaRefs>
-    <ds:schemaRef ds:uri="http://schemas.microsoft.com/sharepoint/v3/contenttype/forms"/>
+    <ds:schemaRef ds:uri="http://schemas.microsoft.com/office/2006/metadata/properties"/>
+    <ds:schemaRef ds:uri="http://schemas.microsoft.com/office/infopath/2007/PartnerControls"/>
   </ds:schemaRefs>
 </ds:datastoreItem>
 </file>
@@ -9678,10 +7085,9 @@
 </file>
 
 <file path=customXml/itemProps3.xml><?xml version="1.0" encoding="utf-8"?>
-<ds:datastoreItem xmlns:ds="http://schemas.openxmlformats.org/officeDocument/2006/customXml" ds:itemID="{2149E239-D122-40A9-AB11-D677033190C0}">
+<ds:datastoreItem xmlns:ds="http://schemas.openxmlformats.org/officeDocument/2006/customXml" ds:itemID="{B778572B-7D4E-4A33-82E0-6D91E9A8F67C}">
   <ds:schemaRefs>
-    <ds:schemaRef ds:uri="http://schemas.microsoft.com/office/2006/metadata/properties"/>
-    <ds:schemaRef ds:uri="http://schemas.microsoft.com/office/infopath/2007/PartnerControls"/>
+    <ds:schemaRef ds:uri="http://schemas.microsoft.com/sharepoint/v3/contenttype/forms"/>
   </ds:schemaRefs>
 </ds:datastoreItem>
 </file>

</xml_diff>